<commit_message>
cambios en la presentacion
</commit_message>
<xml_diff>
--- a/HandsOn/Group03/Presentacion.pptx
+++ b/HandsOn/Group03/Presentacion.pptx
@@ -7,29 +7,30 @@
   <p:sldIdLst>
     <p:sldId id="256" r:id="rId5"/>
     <p:sldId id="258" r:id="rId6"/>
-    <p:sldId id="260" r:id="rId7"/>
-    <p:sldId id="261" r:id="rId8"/>
-    <p:sldId id="262" r:id="rId9"/>
-    <p:sldId id="263" r:id="rId10"/>
-    <p:sldId id="264" r:id="rId11"/>
-    <p:sldId id="265" r:id="rId12"/>
-    <p:sldId id="266" r:id="rId13"/>
-    <p:sldId id="267" r:id="rId14"/>
-    <p:sldId id="268" r:id="rId15"/>
-    <p:sldId id="269" r:id="rId16"/>
-    <p:sldId id="270" r:id="rId17"/>
-    <p:sldId id="275" r:id="rId18"/>
-    <p:sldId id="276" r:id="rId19"/>
-    <p:sldId id="277" r:id="rId20"/>
-    <p:sldId id="278" r:id="rId21"/>
-    <p:sldId id="271" r:id="rId22"/>
-    <p:sldId id="273" r:id="rId23"/>
-    <p:sldId id="274" r:id="rId24"/>
-    <p:sldId id="272" r:id="rId25"/>
-    <p:sldId id="279" r:id="rId26"/>
-    <p:sldId id="280" r:id="rId27"/>
-    <p:sldId id="281" r:id="rId28"/>
-    <p:sldId id="282" r:id="rId29"/>
+    <p:sldId id="283" r:id="rId7"/>
+    <p:sldId id="260" r:id="rId8"/>
+    <p:sldId id="261" r:id="rId9"/>
+    <p:sldId id="262" r:id="rId10"/>
+    <p:sldId id="263" r:id="rId11"/>
+    <p:sldId id="264" r:id="rId12"/>
+    <p:sldId id="265" r:id="rId13"/>
+    <p:sldId id="266" r:id="rId14"/>
+    <p:sldId id="267" r:id="rId15"/>
+    <p:sldId id="268" r:id="rId16"/>
+    <p:sldId id="269" r:id="rId17"/>
+    <p:sldId id="270" r:id="rId18"/>
+    <p:sldId id="275" r:id="rId19"/>
+    <p:sldId id="276" r:id="rId20"/>
+    <p:sldId id="277" r:id="rId21"/>
+    <p:sldId id="278" r:id="rId22"/>
+    <p:sldId id="271" r:id="rId23"/>
+    <p:sldId id="273" r:id="rId24"/>
+    <p:sldId id="274" r:id="rId25"/>
+    <p:sldId id="272" r:id="rId26"/>
+    <p:sldId id="279" r:id="rId27"/>
+    <p:sldId id="280" r:id="rId28"/>
+    <p:sldId id="281" r:id="rId29"/>
+    <p:sldId id="282" r:id="rId30"/>
   </p:sldIdLst>
   <p:sldSz cx="12192000" cy="6858000"/>
   <p:notesSz cx="6858000" cy="9144000"/>
@@ -141,6 +142,7 @@
   <p1510:revLst>
     <p1510:client id="{01F64346-84EA-2F88-830E-9C71141496E7}" v="73" vWet="74" dt="2023-11-10T09:58:24.520"/>
     <p1510:client id="{17C97C69-17C0-4341-83E0-151432A9759D}" v="403" dt="2023-11-10T13:09:12.785"/>
+    <p1510:client id="{A859837F-7983-36F8-B953-D17561018244}" v="31" dt="2023-11-12T12:00:12.700"/>
     <p1510:client id="{C4668F3A-6895-1FB2-40A2-D1788A63F24B}" v="2" dt="2023-11-11T15:54:31.539"/>
   </p1510:revLst>
 </p1510:revInfo>
@@ -308,7 +310,7 @@
           <a:p>
             <a:fld id="{E6171E64-FE02-4DE5-B72F-53C3706641C3}" type="datetimeFigureOut">
               <a:rPr lang="en-US" smtClean="0"/>
-              <a:t>11/11/2023</a:t>
+              <a:t>11/12/2023</a:t>
             </a:fld>
             <a:endParaRPr lang="en-US"/>
           </a:p>
@@ -695,7 +697,7 @@
           <a:p>
             <a:fld id="{E6171E64-FE02-4DE5-B72F-53C3706641C3}" type="datetimeFigureOut">
               <a:rPr lang="en-US" smtClean="0"/>
-              <a:t>11/11/2023</a:t>
+              <a:t>11/12/2023</a:t>
             </a:fld>
             <a:endParaRPr lang="en-US"/>
           </a:p>
@@ -1088,7 +1090,7 @@
           <a:p>
             <a:fld id="{E6171E64-FE02-4DE5-B72F-53C3706641C3}" type="datetimeFigureOut">
               <a:rPr lang="en-US" smtClean="0"/>
-              <a:t>11/11/2023</a:t>
+              <a:t>11/12/2023</a:t>
             </a:fld>
             <a:endParaRPr lang="en-US"/>
           </a:p>
@@ -1503,7 +1505,7 @@
           <a:p>
             <a:fld id="{E6171E64-FE02-4DE5-B72F-53C3706641C3}" type="datetimeFigureOut">
               <a:rPr lang="en-US" smtClean="0"/>
-              <a:t>11/11/2023</a:t>
+              <a:t>11/12/2023</a:t>
             </a:fld>
             <a:endParaRPr lang="en-US"/>
           </a:p>
@@ -1845,7 +1847,7 @@
           <a:p>
             <a:fld id="{E6171E64-FE02-4DE5-B72F-53C3706641C3}" type="datetimeFigureOut">
               <a:rPr lang="en-US" smtClean="0"/>
-              <a:t>11/11/2023</a:t>
+              <a:t>11/12/2023</a:t>
             </a:fld>
             <a:endParaRPr lang="en-US"/>
           </a:p>
@@ -2169,7 +2171,7 @@
           <a:p>
             <a:fld id="{E6171E64-FE02-4DE5-B72F-53C3706641C3}" type="datetimeFigureOut">
               <a:rPr lang="en-US" smtClean="0"/>
-              <a:t>11/11/2023</a:t>
+              <a:t>11/12/2023</a:t>
             </a:fld>
             <a:endParaRPr lang="en-US"/>
           </a:p>
@@ -2650,7 +2652,7 @@
           <a:p>
             <a:fld id="{E6171E64-FE02-4DE5-B72F-53C3706641C3}" type="datetimeFigureOut">
               <a:rPr lang="en-US" smtClean="0"/>
-              <a:t>11/11/2023</a:t>
+              <a:t>11/12/2023</a:t>
             </a:fld>
             <a:endParaRPr lang="en-US"/>
           </a:p>
@@ -2812,7 +2814,7 @@
           <a:p>
             <a:fld id="{E6171E64-FE02-4DE5-B72F-53C3706641C3}" type="datetimeFigureOut">
               <a:rPr lang="en-US" smtClean="0"/>
-              <a:t>11/11/2023</a:t>
+              <a:t>11/12/2023</a:t>
             </a:fld>
             <a:endParaRPr lang="en-US"/>
           </a:p>
@@ -2925,7 +2927,7 @@
           <a:p>
             <a:fld id="{E6171E64-FE02-4DE5-B72F-53C3706641C3}" type="datetimeFigureOut">
               <a:rPr lang="en-US" smtClean="0"/>
-              <a:t>11/11/2023</a:t>
+              <a:t>11/12/2023</a:t>
             </a:fld>
             <a:endParaRPr lang="en-US"/>
           </a:p>
@@ -3247,7 +3249,7 @@
           <a:p>
             <a:fld id="{E6171E64-FE02-4DE5-B72F-53C3706641C3}" type="datetimeFigureOut">
               <a:rPr lang="en-US" smtClean="0"/>
-              <a:t>11/11/2023</a:t>
+              <a:t>11/12/2023</a:t>
             </a:fld>
             <a:endParaRPr lang="en-US"/>
           </a:p>
@@ -3549,7 +3551,7 @@
           <a:p>
             <a:fld id="{E6171E64-FE02-4DE5-B72F-53C3706641C3}" type="datetimeFigureOut">
               <a:rPr lang="en-US" smtClean="0"/>
-              <a:t>11/11/2023</a:t>
+              <a:t>11/12/2023</a:t>
             </a:fld>
             <a:endParaRPr lang="en-US"/>
           </a:p>
@@ -3790,7 +3792,7 @@
           <a:p>
             <a:fld id="{E6171E64-FE02-4DE5-B72F-53C3706641C3}" type="datetimeFigureOut">
               <a:rPr lang="en-US" smtClean="0"/>
-              <a:t>11/11/2023</a:t>
+              <a:t>11/12/2023</a:t>
             </a:fld>
             <a:endParaRPr lang="en-US"/>
           </a:p>
@@ -4656,7 +4658,7 @@
           <p:cNvPr id="3" name="Picture 3">
             <a:extLst>
               <a:ext uri="{FF2B5EF4-FFF2-40B4-BE49-F238E27FC236}">
-                <a16:creationId xmlns:a16="http://schemas.microsoft.com/office/drawing/2014/main" id="{71B03B0D-A19F-8E29-3FE8-A776007F6C50}"/>
+                <a16:creationId xmlns:a16="http://schemas.microsoft.com/office/drawing/2014/main" id="{FBCC56E4-4EE3-DF8C-21AC-B277EDFABFFB}"/>
               </a:ext>
             </a:extLst>
           </p:cNvPr>
@@ -4688,7 +4690,7 @@
           <p:cNvPr id="2" name="Imagen 1">
             <a:extLst>
               <a:ext uri="{FF2B5EF4-FFF2-40B4-BE49-F238E27FC236}">
-                <a16:creationId xmlns:a16="http://schemas.microsoft.com/office/drawing/2014/main" id="{16743892-8FBC-B715-D4A7-9EF17958D3CC}"/>
+                <a16:creationId xmlns:a16="http://schemas.microsoft.com/office/drawing/2014/main" id="{5E4F5F6C-A4A9-E385-77D2-894D6A918CF6}"/>
               </a:ext>
             </a:extLst>
           </p:cNvPr>
@@ -4705,8 +4707,8 @@
         </p:blipFill>
         <p:spPr>
           <a:xfrm>
-            <a:off x="0" y="562084"/>
-            <a:ext cx="12192000" cy="5733822"/>
+            <a:off x="0" y="544467"/>
+            <a:ext cx="12191980" cy="5769076"/>
           </a:xfrm>
           <a:prstGeom prst="rect">
             <a:avLst/>
@@ -4716,7 +4718,7 @@
     </p:spTree>
     <p:extLst>
       <p:ext uri="{BB962C8B-B14F-4D97-AF65-F5344CB8AC3E}">
-        <p14:creationId xmlns:p14="http://schemas.microsoft.com/office/powerpoint/2010/main" val="4098601358"/>
+        <p14:creationId xmlns:p14="http://schemas.microsoft.com/office/powerpoint/2010/main" val="1682990297"/>
       </p:ext>
     </p:extLst>
   </p:cSld>
@@ -4748,7 +4750,7 @@
           <p:cNvPr id="3" name="Picture 3">
             <a:extLst>
               <a:ext uri="{FF2B5EF4-FFF2-40B4-BE49-F238E27FC236}">
-                <a16:creationId xmlns:a16="http://schemas.microsoft.com/office/drawing/2014/main" id="{2415D3B8-5530-2AE8-CADA-91C464C2278F}"/>
+                <a16:creationId xmlns:a16="http://schemas.microsoft.com/office/drawing/2014/main" id="{71B03B0D-A19F-8E29-3FE8-A776007F6C50}"/>
               </a:ext>
             </a:extLst>
           </p:cNvPr>
@@ -4780,7 +4782,7 @@
           <p:cNvPr id="2" name="Imagen 1">
             <a:extLst>
               <a:ext uri="{FF2B5EF4-FFF2-40B4-BE49-F238E27FC236}">
-                <a16:creationId xmlns:a16="http://schemas.microsoft.com/office/drawing/2014/main" id="{0DB66CDA-21E0-B75C-56D7-7C55CBCDE3B9}"/>
+                <a16:creationId xmlns:a16="http://schemas.microsoft.com/office/drawing/2014/main" id="{16743892-8FBC-B715-D4A7-9EF17958D3CC}"/>
               </a:ext>
             </a:extLst>
           </p:cNvPr>
@@ -4797,8 +4799,8 @@
         </p:blipFill>
         <p:spPr>
           <a:xfrm>
-            <a:off x="0" y="571509"/>
-            <a:ext cx="12191980" cy="5714992"/>
+            <a:off x="0" y="562084"/>
+            <a:ext cx="12192000" cy="5733822"/>
           </a:xfrm>
           <a:prstGeom prst="rect">
             <a:avLst/>
@@ -4808,7 +4810,7 @@
     </p:spTree>
     <p:extLst>
       <p:ext uri="{BB962C8B-B14F-4D97-AF65-F5344CB8AC3E}">
-        <p14:creationId xmlns:p14="http://schemas.microsoft.com/office/powerpoint/2010/main" val="101900742"/>
+        <p14:creationId xmlns:p14="http://schemas.microsoft.com/office/powerpoint/2010/main" val="4098601358"/>
       </p:ext>
     </p:extLst>
   </p:cSld>
@@ -4840,7 +4842,7 @@
           <p:cNvPr id="3" name="Picture 3">
             <a:extLst>
               <a:ext uri="{FF2B5EF4-FFF2-40B4-BE49-F238E27FC236}">
-                <a16:creationId xmlns:a16="http://schemas.microsoft.com/office/drawing/2014/main" id="{2706CBE4-1038-FDA1-DC43-65962633CFA7}"/>
+                <a16:creationId xmlns:a16="http://schemas.microsoft.com/office/drawing/2014/main" id="{2415D3B8-5530-2AE8-CADA-91C464C2278F}"/>
               </a:ext>
             </a:extLst>
           </p:cNvPr>
@@ -4872,7 +4874,7 @@
           <p:cNvPr id="2" name="Imagen 1">
             <a:extLst>
               <a:ext uri="{FF2B5EF4-FFF2-40B4-BE49-F238E27FC236}">
-                <a16:creationId xmlns:a16="http://schemas.microsoft.com/office/drawing/2014/main" id="{C2E78F48-EE62-E436-DB54-115960BAB45C}"/>
+                <a16:creationId xmlns:a16="http://schemas.microsoft.com/office/drawing/2014/main" id="{0DB66CDA-21E0-B75C-56D7-7C55CBCDE3B9}"/>
               </a:ext>
             </a:extLst>
           </p:cNvPr>
@@ -4889,8 +4891,8 @@
         </p:blipFill>
         <p:spPr>
           <a:xfrm>
-            <a:off x="0" y="567688"/>
-            <a:ext cx="12192000" cy="5722622"/>
+            <a:off x="0" y="571509"/>
+            <a:ext cx="12191980" cy="5714992"/>
           </a:xfrm>
           <a:prstGeom prst="rect">
             <a:avLst/>
@@ -4900,7 +4902,7 @@
     </p:spTree>
     <p:extLst>
       <p:ext uri="{BB962C8B-B14F-4D97-AF65-F5344CB8AC3E}">
-        <p14:creationId xmlns:p14="http://schemas.microsoft.com/office/powerpoint/2010/main" val="1417128545"/>
+        <p14:creationId xmlns:p14="http://schemas.microsoft.com/office/powerpoint/2010/main" val="101900742"/>
       </p:ext>
     </p:extLst>
   </p:cSld>
@@ -4929,10 +4931,10 @@
       </p:grpSpPr>
       <p:pic>
         <p:nvPicPr>
-          <p:cNvPr id="6" name="Picture 3">
-            <a:extLst>
-              <a:ext uri="{FF2B5EF4-FFF2-40B4-BE49-F238E27FC236}">
-                <a16:creationId xmlns:a16="http://schemas.microsoft.com/office/drawing/2014/main" id="{4122A97E-DB51-A268-5042-7442AC97EF79}"/>
+          <p:cNvPr id="3" name="Picture 3">
+            <a:extLst>
+              <a:ext uri="{FF2B5EF4-FFF2-40B4-BE49-F238E27FC236}">
+                <a16:creationId xmlns:a16="http://schemas.microsoft.com/office/drawing/2014/main" id="{2706CBE4-1038-FDA1-DC43-65962633CFA7}"/>
               </a:ext>
             </a:extLst>
           </p:cNvPr>
@@ -4961,10 +4963,10 @@
       </p:pic>
       <p:pic>
         <p:nvPicPr>
-          <p:cNvPr id="3" name="Imagen 2" descr="Interfaz de usuario gráfica, Texto, Aplicación, Correo electrónico&#10;&#10;Descripción generada automáticamente">
-            <a:extLst>
-              <a:ext uri="{FF2B5EF4-FFF2-40B4-BE49-F238E27FC236}">
-                <a16:creationId xmlns:a16="http://schemas.microsoft.com/office/drawing/2014/main" id="{DC626F57-B6D9-D519-2882-54CBFEA71BBD}"/>
+          <p:cNvPr id="2" name="Imagen 1">
+            <a:extLst>
+              <a:ext uri="{FF2B5EF4-FFF2-40B4-BE49-F238E27FC236}">
+                <a16:creationId xmlns:a16="http://schemas.microsoft.com/office/drawing/2014/main" id="{C2E78F48-EE62-E436-DB54-115960BAB45C}"/>
               </a:ext>
             </a:extLst>
           </p:cNvPr>
@@ -4981,86 +4983,18 @@
         </p:blipFill>
         <p:spPr>
           <a:xfrm>
-            <a:off x="0" y="132588"/>
-            <a:ext cx="11815312" cy="5545002"/>
+            <a:off x="0" y="567688"/>
+            <a:ext cx="12192000" cy="5722622"/>
           </a:xfrm>
           <a:prstGeom prst="rect">
             <a:avLst/>
           </a:prstGeom>
         </p:spPr>
       </p:pic>
-      <p:sp>
-        <p:nvSpPr>
-          <p:cNvPr id="5" name="CuadroTexto 4">
-            <a:extLst>
-              <a:ext uri="{FF2B5EF4-FFF2-40B4-BE49-F238E27FC236}">
-                <a16:creationId xmlns:a16="http://schemas.microsoft.com/office/drawing/2014/main" id="{57E668E5-23F4-8374-1067-32EFBC67F4A7}"/>
-              </a:ext>
-            </a:extLst>
-          </p:cNvPr>
-          <p:cNvSpPr txBox="1"/>
-          <p:nvPr/>
-        </p:nvSpPr>
-        <p:spPr>
-          <a:xfrm>
-            <a:off x="7213600" y="4332850"/>
-            <a:ext cx="4601712" cy="1477328"/>
-          </a:xfrm>
-          <a:prstGeom prst="rect">
-            <a:avLst/>
-          </a:prstGeom>
-          <a:noFill/>
-        </p:spPr>
-        <p:txBody>
-          <a:bodyPr wrap="square">
-            <a:spAutoFit/>
-          </a:bodyPr>
-          <a:lstStyle/>
-          <a:p>
-            <a:r>
-              <a:rPr lang="es-ES" dirty="0">
-                <a:hlinkClick r:id="rId4"/>
-              </a:rPr>
-              <a:t>https://wikidata.org/prop/direct/P31</a:t>
-            </a:r>
-            <a:endParaRPr lang="es-ES" dirty="0"/>
-          </a:p>
-          <a:p>
-            <a:r>
-              <a:rPr lang="es-ES" dirty="0">
-                <a:hlinkClick r:id="rId5"/>
-              </a:rPr>
-              <a:t>https://wikidata.org/prop/direct/P131</a:t>
-            </a:r>
-            <a:endParaRPr lang="es-ES" dirty="0"/>
-          </a:p>
-          <a:p>
-            <a:r>
-              <a:rPr lang="es-ES" dirty="0">
-                <a:hlinkClick r:id="rId6"/>
-              </a:rPr>
-              <a:t>https://wikidata.org/prop/direct/P17</a:t>
-            </a:r>
-            <a:endParaRPr lang="es-ES" dirty="0"/>
-          </a:p>
-          <a:p>
-            <a:r>
-              <a:rPr lang="es-ES" dirty="0">
-                <a:hlinkClick r:id="rId7"/>
-              </a:rPr>
-              <a:t>https://wikidata.org/prop/direct/P1343</a:t>
-            </a:r>
-            <a:endParaRPr lang="es-ES" dirty="0"/>
-          </a:p>
-          <a:p>
-            <a:endParaRPr lang="es-ES" dirty="0"/>
-          </a:p>
-        </p:txBody>
-      </p:sp>
     </p:spTree>
     <p:extLst>
       <p:ext uri="{BB962C8B-B14F-4D97-AF65-F5344CB8AC3E}">
-        <p14:creationId xmlns:p14="http://schemas.microsoft.com/office/powerpoint/2010/main" val="3386082475"/>
+        <p14:creationId xmlns:p14="http://schemas.microsoft.com/office/powerpoint/2010/main" val="1417128545"/>
       </p:ext>
     </p:extLst>
   </p:cSld>
@@ -5119,52 +5053,12 @@
           <a:noFill/>
         </p:spPr>
       </p:pic>
-      <p:sp>
-        <p:nvSpPr>
-          <p:cNvPr id="5" name="CuadroTexto 4">
-            <a:extLst>
-              <a:ext uri="{FF2B5EF4-FFF2-40B4-BE49-F238E27FC236}">
-                <a16:creationId xmlns:a16="http://schemas.microsoft.com/office/drawing/2014/main" id="{57E668E5-23F4-8374-1067-32EFBC67F4A7}"/>
-              </a:ext>
-            </a:extLst>
-          </p:cNvPr>
-          <p:cNvSpPr txBox="1"/>
-          <p:nvPr/>
-        </p:nvSpPr>
-        <p:spPr>
-          <a:xfrm>
-            <a:off x="88070" y="3130788"/>
-            <a:ext cx="4601712" cy="369332"/>
-          </a:xfrm>
-          <a:prstGeom prst="rect">
-            <a:avLst/>
-          </a:prstGeom>
-          <a:solidFill>
-            <a:schemeClr val="bg1"/>
-          </a:solidFill>
-        </p:spPr>
-        <p:txBody>
-          <a:bodyPr wrap="square">
-            <a:spAutoFit/>
-          </a:bodyPr>
-          <a:lstStyle/>
-          <a:p>
-            <a:r>
-              <a:rPr lang="es-ES" dirty="0">
-                <a:hlinkClick r:id="rId3"/>
-              </a:rPr>
-              <a:t>https://wikidata.org/prop/direct/P31</a:t>
-            </a:r>
-            <a:endParaRPr lang="es-ES" dirty="0"/>
-          </a:p>
-        </p:txBody>
-      </p:sp>
       <p:pic>
         <p:nvPicPr>
-          <p:cNvPr id="4" name="Imagen 3">
-            <a:extLst>
-              <a:ext uri="{FF2B5EF4-FFF2-40B4-BE49-F238E27FC236}">
-                <a16:creationId xmlns:a16="http://schemas.microsoft.com/office/drawing/2014/main" id="{9B8AF7DE-D2AD-2ED0-9797-A9F70A018B06}"/>
+          <p:cNvPr id="3" name="Imagen 2" descr="Interfaz de usuario gráfica, Texto, Aplicación, Correo electrónico&#10;&#10;Descripción generada automáticamente">
+            <a:extLst>
+              <a:ext uri="{FF2B5EF4-FFF2-40B4-BE49-F238E27FC236}">
+                <a16:creationId xmlns:a16="http://schemas.microsoft.com/office/drawing/2014/main" id="{DC626F57-B6D9-D519-2882-54CBFEA71BBD}"/>
               </a:ext>
             </a:extLst>
           </p:cNvPr>
@@ -5174,25 +5068,93 @@
           <p:nvPr/>
         </p:nvPicPr>
         <p:blipFill>
-          <a:blip r:embed="rId4"/>
+          <a:blip r:embed="rId3"/>
           <a:stretch>
             <a:fillRect/>
           </a:stretch>
         </p:blipFill>
         <p:spPr>
           <a:xfrm>
-            <a:off x="4418782" y="696451"/>
-            <a:ext cx="7360028" cy="5607338"/>
+            <a:off x="0" y="132588"/>
+            <a:ext cx="11815312" cy="5545002"/>
           </a:xfrm>
           <a:prstGeom prst="rect">
             <a:avLst/>
           </a:prstGeom>
         </p:spPr>
       </p:pic>
+      <p:sp>
+        <p:nvSpPr>
+          <p:cNvPr id="5" name="CuadroTexto 4">
+            <a:extLst>
+              <a:ext uri="{FF2B5EF4-FFF2-40B4-BE49-F238E27FC236}">
+                <a16:creationId xmlns:a16="http://schemas.microsoft.com/office/drawing/2014/main" id="{57E668E5-23F4-8374-1067-32EFBC67F4A7}"/>
+              </a:ext>
+            </a:extLst>
+          </p:cNvPr>
+          <p:cNvSpPr txBox="1"/>
+          <p:nvPr/>
+        </p:nvSpPr>
+        <p:spPr>
+          <a:xfrm>
+            <a:off x="7213600" y="4332850"/>
+            <a:ext cx="4601712" cy="1477328"/>
+          </a:xfrm>
+          <a:prstGeom prst="rect">
+            <a:avLst/>
+          </a:prstGeom>
+          <a:noFill/>
+        </p:spPr>
+        <p:txBody>
+          <a:bodyPr wrap="square">
+            <a:spAutoFit/>
+          </a:bodyPr>
+          <a:lstStyle/>
+          <a:p>
+            <a:r>
+              <a:rPr lang="es-ES" dirty="0">
+                <a:hlinkClick r:id="rId4"/>
+              </a:rPr>
+              <a:t>https://wikidata.org/prop/direct/P31</a:t>
+            </a:r>
+            <a:endParaRPr lang="es-ES" dirty="0"/>
+          </a:p>
+          <a:p>
+            <a:r>
+              <a:rPr lang="es-ES" dirty="0">
+                <a:hlinkClick r:id="rId5"/>
+              </a:rPr>
+              <a:t>https://wikidata.org/prop/direct/P131</a:t>
+            </a:r>
+            <a:endParaRPr lang="es-ES" dirty="0"/>
+          </a:p>
+          <a:p>
+            <a:r>
+              <a:rPr lang="es-ES" dirty="0">
+                <a:hlinkClick r:id="rId6"/>
+              </a:rPr>
+              <a:t>https://wikidata.org/prop/direct/P17</a:t>
+            </a:r>
+            <a:endParaRPr lang="es-ES" dirty="0"/>
+          </a:p>
+          <a:p>
+            <a:r>
+              <a:rPr lang="es-ES" dirty="0">
+                <a:hlinkClick r:id="rId7"/>
+              </a:rPr>
+              <a:t>https://wikidata.org/prop/direct/P1343</a:t>
+            </a:r>
+            <a:endParaRPr lang="es-ES" dirty="0"/>
+          </a:p>
+          <a:p>
+            <a:endParaRPr lang="es-ES" dirty="0"/>
+          </a:p>
+        </p:txBody>
+      </p:sp>
     </p:spTree>
     <p:extLst>
       <p:ext uri="{BB962C8B-B14F-4D97-AF65-F5344CB8AC3E}">
-        <p14:creationId xmlns:p14="http://schemas.microsoft.com/office/powerpoint/2010/main" val="2003724065"/>
+        <p14:creationId xmlns:p14="http://schemas.microsoft.com/office/powerpoint/2010/main" val="3386082475"/>
       </p:ext>
     </p:extLst>
   </p:cSld>
@@ -5285,7 +5247,7 @@
               <a:rPr lang="es-ES" dirty="0">
                 <a:hlinkClick r:id="rId3"/>
               </a:rPr>
-              <a:t>https://wikidata.org/prop/direct/P131</a:t>
+              <a:t>https://wikidata.org/prop/direct/P31</a:t>
             </a:r>
             <a:endParaRPr lang="es-ES" dirty="0"/>
           </a:p>
@@ -5293,10 +5255,10 @@
       </p:sp>
       <p:pic>
         <p:nvPicPr>
-          <p:cNvPr id="3" name="Imagen 2">
-            <a:extLst>
-              <a:ext uri="{FF2B5EF4-FFF2-40B4-BE49-F238E27FC236}">
-                <a16:creationId xmlns:a16="http://schemas.microsoft.com/office/drawing/2014/main" id="{1B7C0C6E-48A2-A827-50D2-EB904F39A79C}"/>
+          <p:cNvPr id="4" name="Imagen 3">
+            <a:extLst>
+              <a:ext uri="{FF2B5EF4-FFF2-40B4-BE49-F238E27FC236}">
+                <a16:creationId xmlns:a16="http://schemas.microsoft.com/office/drawing/2014/main" id="{9B8AF7DE-D2AD-2ED0-9797-A9F70A018B06}"/>
               </a:ext>
             </a:extLst>
           </p:cNvPr>
@@ -5313,8 +5275,8 @@
         </p:blipFill>
         <p:spPr>
           <a:xfrm>
-            <a:off x="4274623" y="639298"/>
-            <a:ext cx="7645793" cy="5721644"/>
+            <a:off x="4418782" y="696451"/>
+            <a:ext cx="7360028" cy="5607338"/>
           </a:xfrm>
           <a:prstGeom prst="rect">
             <a:avLst/>
@@ -5324,7 +5286,7 @@
     </p:spTree>
     <p:extLst>
       <p:ext uri="{BB962C8B-B14F-4D97-AF65-F5344CB8AC3E}">
-        <p14:creationId xmlns:p14="http://schemas.microsoft.com/office/powerpoint/2010/main" val="127913125"/>
+        <p14:creationId xmlns:p14="http://schemas.microsoft.com/office/powerpoint/2010/main" val="2003724065"/>
       </p:ext>
     </p:extLst>
   </p:cSld>
@@ -5397,7 +5359,7 @@
         </p:nvSpPr>
         <p:spPr>
           <a:xfrm>
-            <a:off x="77910" y="3130788"/>
+            <a:off x="88070" y="3130788"/>
             <a:ext cx="4601712" cy="369332"/>
           </a:xfrm>
           <a:prstGeom prst="rect">
@@ -5417,7 +5379,7 @@
               <a:rPr lang="es-ES" dirty="0">
                 <a:hlinkClick r:id="rId3"/>
               </a:rPr>
-              <a:t>https://wikidata.org/prop/direct/P17</a:t>
+              <a:t>https://wikidata.org/prop/direct/P131</a:t>
             </a:r>
             <a:endParaRPr lang="es-ES" dirty="0"/>
           </a:p>
@@ -5428,7 +5390,7 @@
           <p:cNvPr id="3" name="Imagen 2">
             <a:extLst>
               <a:ext uri="{FF2B5EF4-FFF2-40B4-BE49-F238E27FC236}">
-                <a16:creationId xmlns:a16="http://schemas.microsoft.com/office/drawing/2014/main" id="{040F17E9-418D-8E42-6377-3AC0573CC141}"/>
+                <a16:creationId xmlns:a16="http://schemas.microsoft.com/office/drawing/2014/main" id="{1B7C0C6E-48A2-A827-50D2-EB904F39A79C}"/>
               </a:ext>
             </a:extLst>
           </p:cNvPr>
@@ -5445,8 +5407,8 @@
         </p:blipFill>
         <p:spPr>
           <a:xfrm>
-            <a:off x="4114365" y="552297"/>
-            <a:ext cx="8077615" cy="5753396"/>
+            <a:off x="4274623" y="639298"/>
+            <a:ext cx="7645793" cy="5721644"/>
           </a:xfrm>
           <a:prstGeom prst="rect">
             <a:avLst/>
@@ -5456,7 +5418,7 @@
     </p:spTree>
     <p:extLst>
       <p:ext uri="{BB962C8B-B14F-4D97-AF65-F5344CB8AC3E}">
-        <p14:creationId xmlns:p14="http://schemas.microsoft.com/office/powerpoint/2010/main" val="2706610840"/>
+        <p14:creationId xmlns:p14="http://schemas.microsoft.com/office/powerpoint/2010/main" val="127913125"/>
       </p:ext>
     </p:extLst>
   </p:cSld>
@@ -5529,7 +5491,7 @@
         </p:nvSpPr>
         <p:spPr>
           <a:xfrm>
-            <a:off x="88070" y="3130788"/>
+            <a:off x="77910" y="3130788"/>
             <a:ext cx="4601712" cy="369332"/>
           </a:xfrm>
           <a:prstGeom prst="rect">
@@ -5549,7 +5511,7 @@
               <a:rPr lang="es-ES" dirty="0">
                 <a:hlinkClick r:id="rId3"/>
               </a:rPr>
-              <a:t>https://wikidata.org/prop/direct/P1343</a:t>
+              <a:t>https://wikidata.org/prop/direct/P17</a:t>
             </a:r>
             <a:endParaRPr lang="es-ES" dirty="0"/>
           </a:p>
@@ -5560,7 +5522,7 @@
           <p:cNvPr id="3" name="Imagen 2">
             <a:extLst>
               <a:ext uri="{FF2B5EF4-FFF2-40B4-BE49-F238E27FC236}">
-                <a16:creationId xmlns:a16="http://schemas.microsoft.com/office/drawing/2014/main" id="{961662CC-1D46-15B6-8916-04C64585F117}"/>
+                <a16:creationId xmlns:a16="http://schemas.microsoft.com/office/drawing/2014/main" id="{040F17E9-418D-8E42-6377-3AC0573CC141}"/>
               </a:ext>
             </a:extLst>
           </p:cNvPr>
@@ -5577,8 +5539,8 @@
         </p:blipFill>
         <p:spPr>
           <a:xfrm>
-            <a:off x="4463856" y="609450"/>
-            <a:ext cx="7531487" cy="5639090"/>
+            <a:off x="4114365" y="552297"/>
+            <a:ext cx="8077615" cy="5753396"/>
           </a:xfrm>
           <a:prstGeom prst="rect">
             <a:avLst/>
@@ -5588,7 +5550,7 @@
     </p:spTree>
     <p:extLst>
       <p:ext uri="{BB962C8B-B14F-4D97-AF65-F5344CB8AC3E}">
-        <p14:creationId xmlns:p14="http://schemas.microsoft.com/office/powerpoint/2010/main" val="3046631225"/>
+        <p14:creationId xmlns:p14="http://schemas.microsoft.com/office/powerpoint/2010/main" val="2706610840"/>
       </p:ext>
     </p:extLst>
   </p:cSld>
@@ -5617,10 +5579,10 @@
       </p:grpSpPr>
       <p:pic>
         <p:nvPicPr>
-          <p:cNvPr id="3" name="Picture 3">
-            <a:extLst>
-              <a:ext uri="{FF2B5EF4-FFF2-40B4-BE49-F238E27FC236}">
-                <a16:creationId xmlns:a16="http://schemas.microsoft.com/office/drawing/2014/main" id="{7626C21C-41FC-DD86-3564-21605378321C}"/>
+          <p:cNvPr id="6" name="Picture 3">
+            <a:extLst>
+              <a:ext uri="{FF2B5EF4-FFF2-40B4-BE49-F238E27FC236}">
+                <a16:creationId xmlns:a16="http://schemas.microsoft.com/office/drawing/2014/main" id="{4122A97E-DB51-A268-5042-7442AC97EF79}"/>
               </a:ext>
             </a:extLst>
           </p:cNvPr>
@@ -5647,12 +5609,52 @@
           <a:noFill/>
         </p:spPr>
       </p:pic>
+      <p:sp>
+        <p:nvSpPr>
+          <p:cNvPr id="5" name="CuadroTexto 4">
+            <a:extLst>
+              <a:ext uri="{FF2B5EF4-FFF2-40B4-BE49-F238E27FC236}">
+                <a16:creationId xmlns:a16="http://schemas.microsoft.com/office/drawing/2014/main" id="{57E668E5-23F4-8374-1067-32EFBC67F4A7}"/>
+              </a:ext>
+            </a:extLst>
+          </p:cNvPr>
+          <p:cNvSpPr txBox="1"/>
+          <p:nvPr/>
+        </p:nvSpPr>
+        <p:spPr>
+          <a:xfrm>
+            <a:off x="88070" y="3130788"/>
+            <a:ext cx="4601712" cy="369332"/>
+          </a:xfrm>
+          <a:prstGeom prst="rect">
+            <a:avLst/>
+          </a:prstGeom>
+          <a:solidFill>
+            <a:schemeClr val="bg1"/>
+          </a:solidFill>
+        </p:spPr>
+        <p:txBody>
+          <a:bodyPr wrap="square">
+            <a:spAutoFit/>
+          </a:bodyPr>
+          <a:lstStyle/>
+          <a:p>
+            <a:r>
+              <a:rPr lang="es-ES" dirty="0">
+                <a:hlinkClick r:id="rId3"/>
+              </a:rPr>
+              <a:t>https://wikidata.org/prop/direct/P1343</a:t>
+            </a:r>
+            <a:endParaRPr lang="es-ES" dirty="0"/>
+          </a:p>
+        </p:txBody>
+      </p:sp>
       <p:pic>
         <p:nvPicPr>
-          <p:cNvPr id="2" name="Imagen 1" descr="Interfaz de usuario gráfica, Texto, Aplicación, Correo electrónico&#10;&#10;Descripción generada automáticamente">
-            <a:extLst>
-              <a:ext uri="{FF2B5EF4-FFF2-40B4-BE49-F238E27FC236}">
-                <a16:creationId xmlns:a16="http://schemas.microsoft.com/office/drawing/2014/main" id="{0DB10173-5EF5-8C29-CEB4-4672EF96157B}"/>
+          <p:cNvPr id="3" name="Imagen 2">
+            <a:extLst>
+              <a:ext uri="{FF2B5EF4-FFF2-40B4-BE49-F238E27FC236}">
+                <a16:creationId xmlns:a16="http://schemas.microsoft.com/office/drawing/2014/main" id="{961662CC-1D46-15B6-8916-04C64585F117}"/>
               </a:ext>
             </a:extLst>
           </p:cNvPr>
@@ -5662,15 +5664,15 @@
           <p:nvPr/>
         </p:nvPicPr>
         <p:blipFill>
-          <a:blip r:embed="rId3"/>
+          <a:blip r:embed="rId4"/>
           <a:stretch>
             <a:fillRect/>
           </a:stretch>
         </p:blipFill>
         <p:spPr>
           <a:xfrm>
-            <a:off x="0" y="573459"/>
-            <a:ext cx="12276377" cy="5756221"/>
+            <a:off x="4463856" y="609450"/>
+            <a:ext cx="7531487" cy="5639090"/>
           </a:xfrm>
           <a:prstGeom prst="rect">
             <a:avLst/>
@@ -5680,7 +5682,7 @@
     </p:spTree>
     <p:extLst>
       <p:ext uri="{BB962C8B-B14F-4D97-AF65-F5344CB8AC3E}">
-        <p14:creationId xmlns:p14="http://schemas.microsoft.com/office/powerpoint/2010/main" val="3683001120"/>
+        <p14:creationId xmlns:p14="http://schemas.microsoft.com/office/powerpoint/2010/main" val="3046631225"/>
       </p:ext>
     </p:extLst>
   </p:cSld>
@@ -5712,7 +5714,7 @@
           <p:cNvPr id="3" name="Picture 3">
             <a:extLst>
               <a:ext uri="{FF2B5EF4-FFF2-40B4-BE49-F238E27FC236}">
-                <a16:creationId xmlns:a16="http://schemas.microsoft.com/office/drawing/2014/main" id="{C44A1DC0-0E5B-133D-7B24-11D52755543C}"/>
+                <a16:creationId xmlns:a16="http://schemas.microsoft.com/office/drawing/2014/main" id="{7626C21C-41FC-DD86-3564-21605378321C}"/>
               </a:ext>
             </a:extLst>
           </p:cNvPr>
@@ -5741,10 +5743,10 @@
       </p:pic>
       <p:pic>
         <p:nvPicPr>
-          <p:cNvPr id="2" name="Imagen 1">
-            <a:extLst>
-              <a:ext uri="{FF2B5EF4-FFF2-40B4-BE49-F238E27FC236}">
-                <a16:creationId xmlns:a16="http://schemas.microsoft.com/office/drawing/2014/main" id="{24BA3AF8-6B2A-129D-5DBF-57191ED63A8B}"/>
+          <p:cNvPr id="2" name="Imagen 1" descr="Interfaz de usuario gráfica, Texto, Aplicación, Correo electrónico&#10;&#10;Descripción generada automáticamente">
+            <a:extLst>
+              <a:ext uri="{FF2B5EF4-FFF2-40B4-BE49-F238E27FC236}">
+                <a16:creationId xmlns:a16="http://schemas.microsoft.com/office/drawing/2014/main" id="{0DB10173-5EF5-8C29-CEB4-4672EF96157B}"/>
               </a:ext>
             </a:extLst>
           </p:cNvPr>
@@ -5761,8 +5763,8 @@
         </p:blipFill>
         <p:spPr>
           <a:xfrm>
-            <a:off x="0" y="571746"/>
-            <a:ext cx="12191980" cy="5714515"/>
+            <a:off x="0" y="573459"/>
+            <a:ext cx="12276377" cy="5756221"/>
           </a:xfrm>
           <a:prstGeom prst="rect">
             <a:avLst/>
@@ -5772,7 +5774,7 @@
     </p:spTree>
     <p:extLst>
       <p:ext uri="{BB962C8B-B14F-4D97-AF65-F5344CB8AC3E}">
-        <p14:creationId xmlns:p14="http://schemas.microsoft.com/office/powerpoint/2010/main" val="3355215807"/>
+        <p14:creationId xmlns:p14="http://schemas.microsoft.com/office/powerpoint/2010/main" val="3683001120"/>
       </p:ext>
     </p:extLst>
   </p:cSld>
@@ -6038,7 +6040,7 @@
                   <a:spcPts val="600"/>
                 </a:spcAft>
               </a:pPr>
-              <a:t>11/11/2023</a:t>
+              <a:t>11/12/2023</a:t>
             </a:fld>
             <a:endParaRPr lang="en-US" dirty="0">
               <a:solidFill>
@@ -6209,7 +6211,7 @@
           <p:cNvPr id="3" name="Picture 3">
             <a:extLst>
               <a:ext uri="{FF2B5EF4-FFF2-40B4-BE49-F238E27FC236}">
-                <a16:creationId xmlns:a16="http://schemas.microsoft.com/office/drawing/2014/main" id="{1A1B9E5A-E205-92A0-5AE6-96C2EA9BA532}"/>
+                <a16:creationId xmlns:a16="http://schemas.microsoft.com/office/drawing/2014/main" id="{C44A1DC0-0E5B-133D-7B24-11D52755543C}"/>
               </a:ext>
             </a:extLst>
           </p:cNvPr>
@@ -6241,7 +6243,7 @@
           <p:cNvPr id="2" name="Imagen 1">
             <a:extLst>
               <a:ext uri="{FF2B5EF4-FFF2-40B4-BE49-F238E27FC236}">
-                <a16:creationId xmlns:a16="http://schemas.microsoft.com/office/drawing/2014/main" id="{E8DA32F7-8C16-3FA7-1841-5BDC58AF7332}"/>
+                <a16:creationId xmlns:a16="http://schemas.microsoft.com/office/drawing/2014/main" id="{24BA3AF8-6B2A-129D-5DBF-57191ED63A8B}"/>
               </a:ext>
             </a:extLst>
           </p:cNvPr>
@@ -6258,8 +6260,8 @@
         </p:blipFill>
         <p:spPr>
           <a:xfrm>
-            <a:off x="0" y="597316"/>
-            <a:ext cx="12191980" cy="5730230"/>
+            <a:off x="0" y="571746"/>
+            <a:ext cx="12191980" cy="5714515"/>
           </a:xfrm>
           <a:prstGeom prst="rect">
             <a:avLst/>
@@ -6269,7 +6271,7 @@
     </p:spTree>
     <p:extLst>
       <p:ext uri="{BB962C8B-B14F-4D97-AF65-F5344CB8AC3E}">
-        <p14:creationId xmlns:p14="http://schemas.microsoft.com/office/powerpoint/2010/main" val="2695811649"/>
+        <p14:creationId xmlns:p14="http://schemas.microsoft.com/office/powerpoint/2010/main" val="3355215807"/>
       </p:ext>
     </p:extLst>
   </p:cSld>
@@ -6301,7 +6303,7 @@
           <p:cNvPr id="3" name="Picture 3">
             <a:extLst>
               <a:ext uri="{FF2B5EF4-FFF2-40B4-BE49-F238E27FC236}">
-                <a16:creationId xmlns:a16="http://schemas.microsoft.com/office/drawing/2014/main" id="{15B94115-97ED-B1A3-A8F8-550889C39EAE}"/>
+                <a16:creationId xmlns:a16="http://schemas.microsoft.com/office/drawing/2014/main" id="{1A1B9E5A-E205-92A0-5AE6-96C2EA9BA532}"/>
               </a:ext>
             </a:extLst>
           </p:cNvPr>
@@ -6330,10 +6332,10 @@
       </p:pic>
       <p:pic>
         <p:nvPicPr>
-          <p:cNvPr id="2" name="Imagen 1" descr="Interfaz de usuario gráfica, Texto, Aplicación, Correo electrónico&#10;&#10;Descripción generada automáticamente">
-            <a:extLst>
-              <a:ext uri="{FF2B5EF4-FFF2-40B4-BE49-F238E27FC236}">
-                <a16:creationId xmlns:a16="http://schemas.microsoft.com/office/drawing/2014/main" id="{FB35950D-C1A5-CDBA-E65E-09C5B1A943C2}"/>
+          <p:cNvPr id="2" name="Imagen 1">
+            <a:extLst>
+              <a:ext uri="{FF2B5EF4-FFF2-40B4-BE49-F238E27FC236}">
+                <a16:creationId xmlns:a16="http://schemas.microsoft.com/office/drawing/2014/main" id="{E8DA32F7-8C16-3FA7-1841-5BDC58AF7332}"/>
               </a:ext>
             </a:extLst>
           </p:cNvPr>
@@ -6350,8 +6352,8 @@
         </p:blipFill>
         <p:spPr>
           <a:xfrm>
-            <a:off x="0" y="580341"/>
-            <a:ext cx="12191980" cy="5702614"/>
+            <a:off x="0" y="597316"/>
+            <a:ext cx="12191980" cy="5730230"/>
           </a:xfrm>
           <a:prstGeom prst="rect">
             <a:avLst/>
@@ -6361,7 +6363,7 @@
     </p:spTree>
     <p:extLst>
       <p:ext uri="{BB962C8B-B14F-4D97-AF65-F5344CB8AC3E}">
-        <p14:creationId xmlns:p14="http://schemas.microsoft.com/office/powerpoint/2010/main" val="3107567654"/>
+        <p14:creationId xmlns:p14="http://schemas.microsoft.com/office/powerpoint/2010/main" val="2695811649"/>
       </p:ext>
     </p:extLst>
   </p:cSld>
@@ -6390,10 +6392,10 @@
       </p:grpSpPr>
       <p:pic>
         <p:nvPicPr>
-          <p:cNvPr id="6" name="Picture 3">
-            <a:extLst>
-              <a:ext uri="{FF2B5EF4-FFF2-40B4-BE49-F238E27FC236}">
-                <a16:creationId xmlns:a16="http://schemas.microsoft.com/office/drawing/2014/main" id="{4122A97E-DB51-A268-5042-7442AC97EF79}"/>
+          <p:cNvPr id="3" name="Picture 3">
+            <a:extLst>
+              <a:ext uri="{FF2B5EF4-FFF2-40B4-BE49-F238E27FC236}">
+                <a16:creationId xmlns:a16="http://schemas.microsoft.com/office/drawing/2014/main" id="{15B94115-97ED-B1A3-A8F8-550889C39EAE}"/>
               </a:ext>
             </a:extLst>
           </p:cNvPr>
@@ -6420,52 +6422,12 @@
           <a:noFill/>
         </p:spPr>
       </p:pic>
-      <p:sp>
-        <p:nvSpPr>
-          <p:cNvPr id="5" name="CuadroTexto 4">
-            <a:extLst>
-              <a:ext uri="{FF2B5EF4-FFF2-40B4-BE49-F238E27FC236}">
-                <a16:creationId xmlns:a16="http://schemas.microsoft.com/office/drawing/2014/main" id="{57E668E5-23F4-8374-1067-32EFBC67F4A7}"/>
-              </a:ext>
-            </a:extLst>
-          </p:cNvPr>
-          <p:cNvSpPr txBox="1"/>
-          <p:nvPr/>
-        </p:nvSpPr>
-        <p:spPr>
-          <a:xfrm>
-            <a:off x="88070" y="3130788"/>
-            <a:ext cx="4601712" cy="369332"/>
-          </a:xfrm>
-          <a:prstGeom prst="rect">
-            <a:avLst/>
-          </a:prstGeom>
-          <a:solidFill>
-            <a:schemeClr val="bg1"/>
-          </a:solidFill>
-        </p:spPr>
-        <p:txBody>
-          <a:bodyPr wrap="square">
-            <a:spAutoFit/>
-          </a:bodyPr>
-          <a:lstStyle/>
-          <a:p>
-            <a:r>
-              <a:rPr lang="es-ES" dirty="0">
-                <a:hlinkClick r:id="rId3"/>
-              </a:rPr>
-              <a:t>https://wikidata.org/prop/direct/P31</a:t>
-            </a:r>
-            <a:endParaRPr lang="es-ES" dirty="0"/>
-          </a:p>
-        </p:txBody>
-      </p:sp>
       <p:pic>
         <p:nvPicPr>
-          <p:cNvPr id="4" name="Imagen 3">
-            <a:extLst>
-              <a:ext uri="{FF2B5EF4-FFF2-40B4-BE49-F238E27FC236}">
-                <a16:creationId xmlns:a16="http://schemas.microsoft.com/office/drawing/2014/main" id="{9B8AF7DE-D2AD-2ED0-9797-A9F70A018B06}"/>
+          <p:cNvPr id="2" name="Imagen 1" descr="Interfaz de usuario gráfica, Texto, Aplicación, Correo electrónico&#10;&#10;Descripción generada automáticamente">
+            <a:extLst>
+              <a:ext uri="{FF2B5EF4-FFF2-40B4-BE49-F238E27FC236}">
+                <a16:creationId xmlns:a16="http://schemas.microsoft.com/office/drawing/2014/main" id="{FB35950D-C1A5-CDBA-E65E-09C5B1A943C2}"/>
               </a:ext>
             </a:extLst>
           </p:cNvPr>
@@ -6475,15 +6437,15 @@
           <p:nvPr/>
         </p:nvPicPr>
         <p:blipFill>
-          <a:blip r:embed="rId4"/>
+          <a:blip r:embed="rId3"/>
           <a:stretch>
             <a:fillRect/>
           </a:stretch>
         </p:blipFill>
         <p:spPr>
           <a:xfrm>
-            <a:off x="4418782" y="696451"/>
-            <a:ext cx="7360028" cy="5607338"/>
+            <a:off x="0" y="580341"/>
+            <a:ext cx="12191980" cy="5702614"/>
           </a:xfrm>
           <a:prstGeom prst="rect">
             <a:avLst/>
@@ -6493,7 +6455,7 @@
     </p:spTree>
     <p:extLst>
       <p:ext uri="{BB962C8B-B14F-4D97-AF65-F5344CB8AC3E}">
-        <p14:creationId xmlns:p14="http://schemas.microsoft.com/office/powerpoint/2010/main" val="1474798320"/>
+        <p14:creationId xmlns:p14="http://schemas.microsoft.com/office/powerpoint/2010/main" val="3107567654"/>
       </p:ext>
     </p:extLst>
   </p:cSld>
@@ -6586,7 +6548,7 @@
               <a:rPr lang="es-ES" dirty="0">
                 <a:hlinkClick r:id="rId3"/>
               </a:rPr>
-              <a:t>https://wikidata.org/prop/direct/P131</a:t>
+              <a:t>https://wikidata.org/prop/direct/P31</a:t>
             </a:r>
             <a:endParaRPr lang="es-ES" dirty="0"/>
           </a:p>
@@ -6594,10 +6556,10 @@
       </p:sp>
       <p:pic>
         <p:nvPicPr>
-          <p:cNvPr id="3" name="Imagen 2">
-            <a:extLst>
-              <a:ext uri="{FF2B5EF4-FFF2-40B4-BE49-F238E27FC236}">
-                <a16:creationId xmlns:a16="http://schemas.microsoft.com/office/drawing/2014/main" id="{1B7C0C6E-48A2-A827-50D2-EB904F39A79C}"/>
+          <p:cNvPr id="4" name="Imagen 3">
+            <a:extLst>
+              <a:ext uri="{FF2B5EF4-FFF2-40B4-BE49-F238E27FC236}">
+                <a16:creationId xmlns:a16="http://schemas.microsoft.com/office/drawing/2014/main" id="{9B8AF7DE-D2AD-2ED0-9797-A9F70A018B06}"/>
               </a:ext>
             </a:extLst>
           </p:cNvPr>
@@ -6614,8 +6576,8 @@
         </p:blipFill>
         <p:spPr>
           <a:xfrm>
-            <a:off x="4274623" y="639298"/>
-            <a:ext cx="7645793" cy="5721644"/>
+            <a:off x="4418782" y="696451"/>
+            <a:ext cx="7360028" cy="5607338"/>
           </a:xfrm>
           <a:prstGeom prst="rect">
             <a:avLst/>
@@ -6625,7 +6587,7 @@
     </p:spTree>
     <p:extLst>
       <p:ext uri="{BB962C8B-B14F-4D97-AF65-F5344CB8AC3E}">
-        <p14:creationId xmlns:p14="http://schemas.microsoft.com/office/powerpoint/2010/main" val="3763137961"/>
+        <p14:creationId xmlns:p14="http://schemas.microsoft.com/office/powerpoint/2010/main" val="1474798320"/>
       </p:ext>
     </p:extLst>
   </p:cSld>
@@ -6698,6 +6660,138 @@
         </p:nvSpPr>
         <p:spPr>
           <a:xfrm>
+            <a:off x="88070" y="3130788"/>
+            <a:ext cx="4601712" cy="369332"/>
+          </a:xfrm>
+          <a:prstGeom prst="rect">
+            <a:avLst/>
+          </a:prstGeom>
+          <a:solidFill>
+            <a:schemeClr val="bg1"/>
+          </a:solidFill>
+        </p:spPr>
+        <p:txBody>
+          <a:bodyPr wrap="square">
+            <a:spAutoFit/>
+          </a:bodyPr>
+          <a:lstStyle/>
+          <a:p>
+            <a:r>
+              <a:rPr lang="es-ES" dirty="0">
+                <a:hlinkClick r:id="rId3"/>
+              </a:rPr>
+              <a:t>https://wikidata.org/prop/direct/P131</a:t>
+            </a:r>
+            <a:endParaRPr lang="es-ES" dirty="0"/>
+          </a:p>
+        </p:txBody>
+      </p:sp>
+      <p:pic>
+        <p:nvPicPr>
+          <p:cNvPr id="3" name="Imagen 2">
+            <a:extLst>
+              <a:ext uri="{FF2B5EF4-FFF2-40B4-BE49-F238E27FC236}">
+                <a16:creationId xmlns:a16="http://schemas.microsoft.com/office/drawing/2014/main" id="{1B7C0C6E-48A2-A827-50D2-EB904F39A79C}"/>
+              </a:ext>
+            </a:extLst>
+          </p:cNvPr>
+          <p:cNvPicPr>
+            <a:picLocks noChangeAspect="1"/>
+          </p:cNvPicPr>
+          <p:nvPr/>
+        </p:nvPicPr>
+        <p:blipFill>
+          <a:blip r:embed="rId4"/>
+          <a:stretch>
+            <a:fillRect/>
+          </a:stretch>
+        </p:blipFill>
+        <p:spPr>
+          <a:xfrm>
+            <a:off x="4274623" y="639298"/>
+            <a:ext cx="7645793" cy="5721644"/>
+          </a:xfrm>
+          <a:prstGeom prst="rect">
+            <a:avLst/>
+          </a:prstGeom>
+        </p:spPr>
+      </p:pic>
+    </p:spTree>
+    <p:extLst>
+      <p:ext uri="{BB962C8B-B14F-4D97-AF65-F5344CB8AC3E}">
+        <p14:creationId xmlns:p14="http://schemas.microsoft.com/office/powerpoint/2010/main" val="3763137961"/>
+      </p:ext>
+    </p:extLst>
+  </p:cSld>
+  <p:clrMapOvr>
+    <a:masterClrMapping/>
+  </p:clrMapOvr>
+</p:sld>
+</file>
+
+<file path=ppt/slides/slide25.xml><?xml version="1.0" encoding="utf-8"?>
+<p:sld xmlns:a="http://schemas.openxmlformats.org/drawingml/2006/main" xmlns:r="http://schemas.openxmlformats.org/officeDocument/2006/relationships" xmlns:p="http://schemas.openxmlformats.org/presentationml/2006/main">
+  <p:cSld>
+    <p:spTree>
+      <p:nvGrpSpPr>
+        <p:cNvPr id="1" name=""/>
+        <p:cNvGrpSpPr/>
+        <p:nvPr/>
+      </p:nvGrpSpPr>
+      <p:grpSpPr>
+        <a:xfrm>
+          <a:off x="0" y="0"/>
+          <a:ext cx="0" cy="0"/>
+          <a:chOff x="0" y="0"/>
+          <a:chExt cx="0" cy="0"/>
+        </a:xfrm>
+      </p:grpSpPr>
+      <p:pic>
+        <p:nvPicPr>
+          <p:cNvPr id="6" name="Picture 3">
+            <a:extLst>
+              <a:ext uri="{FF2B5EF4-FFF2-40B4-BE49-F238E27FC236}">
+                <a16:creationId xmlns:a16="http://schemas.microsoft.com/office/drawing/2014/main" id="{4122A97E-DB51-A268-5042-7442AC97EF79}"/>
+              </a:ext>
+            </a:extLst>
+          </p:cNvPr>
+          <p:cNvPicPr>
+            <a:picLocks noChangeAspect="1"/>
+          </p:cNvPicPr>
+          <p:nvPr/>
+        </p:nvPicPr>
+        <p:blipFill rotWithShape="1">
+          <a:blip r:embed="rId2">
+            <a:alphaModFix amt="50000"/>
+          </a:blip>
+          <a:srcRect t="25000"/>
+          <a:stretch/>
+        </p:blipFill>
+        <p:spPr>
+          <a:xfrm>
+            <a:off x="20" y="0"/>
+            <a:ext cx="12191980" cy="6857990"/>
+          </a:xfrm>
+          <a:prstGeom prst="rect">
+            <a:avLst/>
+          </a:prstGeom>
+          <a:noFill/>
+        </p:spPr>
+      </p:pic>
+      <p:sp>
+        <p:nvSpPr>
+          <p:cNvPr id="5" name="CuadroTexto 4">
+            <a:extLst>
+              <a:ext uri="{FF2B5EF4-FFF2-40B4-BE49-F238E27FC236}">
+                <a16:creationId xmlns:a16="http://schemas.microsoft.com/office/drawing/2014/main" id="{57E668E5-23F4-8374-1067-32EFBC67F4A7}"/>
+              </a:ext>
+            </a:extLst>
+          </p:cNvPr>
+          <p:cNvSpPr txBox="1"/>
+          <p:nvPr/>
+        </p:nvSpPr>
+        <p:spPr>
+          <a:xfrm>
             <a:off x="77910" y="3130788"/>
             <a:ext cx="4601712" cy="369332"/>
           </a:xfrm>
@@ -6767,7 +6861,7 @@
 </p:sld>
 </file>
 
-<file path=ppt/slides/slide25.xml><?xml version="1.0" encoding="utf-8"?>
+<file path=ppt/slides/slide26.xml><?xml version="1.0" encoding="utf-8"?>
 <p:sld xmlns:a="http://schemas.openxmlformats.org/drawingml/2006/main" xmlns:r="http://schemas.openxmlformats.org/officeDocument/2006/relationships" xmlns:p="http://schemas.openxmlformats.org/presentationml/2006/main">
   <p:cSld>
     <p:spTree>
@@ -6924,12 +7018,219 @@
           <a:chExt cx="0" cy="0"/>
         </a:xfrm>
       </p:grpSpPr>
+      <p:grpSp>
+        <p:nvGrpSpPr>
+          <p:cNvPr id="24" name="Group 8">
+            <a:extLst>
+              <a:ext uri="{FF2B5EF4-FFF2-40B4-BE49-F238E27FC236}">
+                <a16:creationId xmlns:a16="http://schemas.microsoft.com/office/drawing/2014/main" id="{F0C817C9-850F-4FB6-B93B-CF3076C4A5C1}"/>
+              </a:ext>
+              <a:ext uri="{C183D7F6-B498-43B3-948B-1728B52AA6E4}">
+                <adec:decorative xmlns:adec="http://schemas.microsoft.com/office/drawing/2017/decorative" val="1"/>
+              </a:ext>
+            </a:extLst>
+          </p:cNvPr>
+          <p:cNvGrpSpPr>
+            <a:grpSpLocks noGrp="1" noUngrp="1" noRot="1" noChangeAspect="1" noMove="1" noResize="1"/>
+          </p:cNvGrpSpPr>
+          <p:nvPr>
+            <p:extLst>
+              <p:ext uri="{386F3935-93C4-4BCD-93E2-E3B085C9AB24}">
+                <p16:designElem xmlns:p16="http://schemas.microsoft.com/office/powerpoint/2015/main" val="1"/>
+              </p:ext>
+            </p:extLst>
+          </p:nvPr>
+        </p:nvGrpSpPr>
+        <p:grpSpPr>
+          <a:xfrm flipH="1">
+            <a:off x="0" y="0"/>
+            <a:ext cx="567782" cy="3306479"/>
+            <a:chOff x="11619770" y="-2005"/>
+            <a:chExt cx="567782" cy="3306479"/>
+          </a:xfrm>
+        </p:grpSpPr>
+        <p:sp>
+          <p:nvSpPr>
+            <p:cNvPr id="10" name="Freeform: Shape 9">
+              <a:extLst>
+                <a:ext uri="{FF2B5EF4-FFF2-40B4-BE49-F238E27FC236}">
+                  <a16:creationId xmlns:a16="http://schemas.microsoft.com/office/drawing/2014/main" id="{159433A8-B67D-4675-AFDE-131069A709FC}"/>
+                </a:ext>
+                <a:ext uri="{C183D7F6-B498-43B3-948B-1728B52AA6E4}">
+                  <adec:decorative xmlns:adec="http://schemas.microsoft.com/office/drawing/2017/decorative" val="1"/>
+                </a:ext>
+              </a:extLst>
+            </p:cNvPr>
+            <p:cNvSpPr/>
+            <p:nvPr>
+              <p:extLst>
+                <p:ext uri="{386F3935-93C4-4BCD-93E2-E3B085C9AB24}">
+                  <p16:designElem xmlns:p16="http://schemas.microsoft.com/office/powerpoint/2015/main" val="1"/>
+                </p:ext>
+              </p:extLst>
+            </p:nvPr>
+          </p:nvSpPr>
+          <p:spPr>
+            <a:xfrm flipV="1">
+              <a:off x="11619770" y="373807"/>
+              <a:ext cx="526228" cy="2930667"/>
+            </a:xfrm>
+            <a:custGeom>
+              <a:avLst/>
+              <a:gdLst>
+                <a:gd name="connsiteX0" fmla="*/ 757287 w 757287"/>
+                <a:gd name="connsiteY0" fmla="*/ 3694096 h 3694096"/>
+                <a:gd name="connsiteX1" fmla="*/ 757287 w 757287"/>
+                <a:gd name="connsiteY1" fmla="*/ 0 h 3694096"/>
+                <a:gd name="connsiteX2" fmla="*/ 0 w 757287"/>
+                <a:gd name="connsiteY2" fmla="*/ 0 h 3694096"/>
+                <a:gd name="connsiteX3" fmla="*/ 0 w 757287"/>
+                <a:gd name="connsiteY3" fmla="*/ 3686094 h 3694096"/>
+              </a:gdLst>
+              <a:ahLst/>
+              <a:cxnLst>
+                <a:cxn ang="0">
+                  <a:pos x="connsiteX0" y="connsiteY0"/>
+                </a:cxn>
+                <a:cxn ang="0">
+                  <a:pos x="connsiteX1" y="connsiteY1"/>
+                </a:cxn>
+                <a:cxn ang="0">
+                  <a:pos x="connsiteX2" y="connsiteY2"/>
+                </a:cxn>
+                <a:cxn ang="0">
+                  <a:pos x="connsiteX3" y="connsiteY3"/>
+                </a:cxn>
+              </a:cxnLst>
+              <a:rect l="l" t="t" r="r" b="b"/>
+              <a:pathLst>
+                <a:path w="757287" h="3694096">
+                  <a:moveTo>
+                    <a:pt x="757287" y="3694096"/>
+                  </a:moveTo>
+                  <a:lnTo>
+                    <a:pt x="757287" y="0"/>
+                  </a:lnTo>
+                  <a:lnTo>
+                    <a:pt x="0" y="0"/>
+                  </a:lnTo>
+                  <a:lnTo>
+                    <a:pt x="0" y="3686094"/>
+                  </a:lnTo>
+                  <a:close/>
+                </a:path>
+              </a:pathLst>
+            </a:custGeom>
+            <a:blipFill dpi="0" rotWithShape="1">
+              <a:blip r:embed="rId2">
+                <a:extLst>
+                  <a:ext uri="{96DAC541-7B7A-43D3-8B79-37D633B846F1}">
+                    <asvg:svgBlip xmlns:asvg="http://schemas.microsoft.com/office/drawing/2016/SVG/main" r:embed="rId3"/>
+                  </a:ext>
+                </a:extLst>
+              </a:blip>
+              <a:srcRect/>
+              <a:tile tx="0" ty="0" sx="6000" sy="6000" flip="none" algn="tl"/>
+            </a:blipFill>
+            <a:ln>
+              <a:noFill/>
+            </a:ln>
+          </p:spPr>
+          <p:style>
+            <a:lnRef idx="2">
+              <a:schemeClr val="accent1">
+                <a:shade val="50000"/>
+              </a:schemeClr>
+            </a:lnRef>
+            <a:fillRef idx="1">
+              <a:schemeClr val="accent1"/>
+            </a:fillRef>
+            <a:effectRef idx="0">
+              <a:schemeClr val="accent1"/>
+            </a:effectRef>
+            <a:fontRef idx="minor">
+              <a:schemeClr val="lt1"/>
+            </a:fontRef>
+          </p:style>
+          <p:txBody>
+            <a:bodyPr wrap="square" rtlCol="0" anchor="ctr">
+              <a:noAutofit/>
+            </a:bodyPr>
+            <a:lstStyle/>
+            <a:p>
+              <a:pPr algn="ctr"/>
+              <a:endParaRPr lang="en-US"/>
+            </a:p>
+          </p:txBody>
+        </p:sp>
+        <p:sp>
+          <p:nvSpPr>
+            <p:cNvPr id="25" name="Rectangle 10">
+              <a:extLst>
+                <a:ext uri="{FF2B5EF4-FFF2-40B4-BE49-F238E27FC236}">
+                  <a16:creationId xmlns:a16="http://schemas.microsoft.com/office/drawing/2014/main" id="{E1CD1C45-6A4D-4237-B39C-2D58F401A8C5}"/>
+                </a:ext>
+                <a:ext uri="{C183D7F6-B498-43B3-948B-1728B52AA6E4}">
+                  <adec:decorative xmlns:adec="http://schemas.microsoft.com/office/drawing/2017/decorative" val="1"/>
+                </a:ext>
+              </a:extLst>
+            </p:cNvPr>
+            <p:cNvSpPr/>
+            <p:nvPr>
+              <p:extLst>
+                <p:ext uri="{386F3935-93C4-4BCD-93E2-E3B085C9AB24}">
+                  <p16:designElem xmlns:p16="http://schemas.microsoft.com/office/powerpoint/2015/main" val="1"/>
+                </p:ext>
+              </p:extLst>
+            </p:nvPr>
+          </p:nvSpPr>
+          <p:spPr>
+            <a:xfrm flipH="1" flipV="1">
+              <a:off x="11980943" y="-2005"/>
+              <a:ext cx="206609" cy="2021305"/>
+            </a:xfrm>
+            <a:prstGeom prst="rect">
+              <a:avLst/>
+            </a:prstGeom>
+            <a:solidFill>
+              <a:schemeClr val="accent2"/>
+            </a:solidFill>
+            <a:ln>
+              <a:noFill/>
+            </a:ln>
+          </p:spPr>
+          <p:style>
+            <a:lnRef idx="2">
+              <a:schemeClr val="accent1">
+                <a:shade val="50000"/>
+              </a:schemeClr>
+            </a:lnRef>
+            <a:fillRef idx="1">
+              <a:schemeClr val="accent1"/>
+            </a:fillRef>
+            <a:effectRef idx="0">
+              <a:schemeClr val="accent1"/>
+            </a:effectRef>
+            <a:fontRef idx="minor">
+              <a:schemeClr val="lt1"/>
+            </a:fontRef>
+          </p:style>
+          <p:txBody>
+            <a:bodyPr rtlCol="0" anchor="ctr"/>
+            <a:lstStyle/>
+            <a:p>
+              <a:pPr algn="ctr"/>
+              <a:endParaRPr lang="en-US"/>
+            </a:p>
+          </p:txBody>
+        </p:sp>
+      </p:grpSp>
       <p:sp useBgFill="1">
         <p:nvSpPr>
-          <p:cNvPr id="7" name="Rectangle 6">
-            <a:extLst>
-              <a:ext uri="{FF2B5EF4-FFF2-40B4-BE49-F238E27FC236}">
-                <a16:creationId xmlns:a16="http://schemas.microsoft.com/office/drawing/2014/main" id="{ECC11440-8FCC-46C6-A3E0-D0649600F55F}"/>
+          <p:cNvPr id="26" name="Rectangle 12">
+            <a:extLst>
+              <a:ext uri="{FF2B5EF4-FFF2-40B4-BE49-F238E27FC236}">
+                <a16:creationId xmlns:a16="http://schemas.microsoft.com/office/drawing/2014/main" id="{277BCF1F-1E1C-40E7-A7B1-3F567EA7BFBE}"/>
               </a:ext>
               <a:ext uri="{C183D7F6-B498-43B3-948B-1728B52AA6E4}">
                 <adec:decorative xmlns:adec="http://schemas.microsoft.com/office/drawing/2017/decorative" val="1"/>
@@ -7000,39 +7301,374 @@
           </a:p>
         </p:txBody>
       </p:sp>
+      <p:sp>
+        <p:nvSpPr>
+          <p:cNvPr id="2" name="Título 1">
+            <a:extLst>
+              <a:ext uri="{FF2B5EF4-FFF2-40B4-BE49-F238E27FC236}">
+                <a16:creationId xmlns:a16="http://schemas.microsoft.com/office/drawing/2014/main" id="{D71865A0-8E53-FD60-E378-2A97356F0C40}"/>
+              </a:ext>
+            </a:extLst>
+          </p:cNvPr>
+          <p:cNvSpPr>
+            <a:spLocks noGrp="1"/>
+          </p:cNvSpPr>
+          <p:nvPr>
+            <p:ph type="title"/>
+          </p:nvPr>
+        </p:nvSpPr>
+        <p:spPr>
+          <a:xfrm>
+            <a:off x="6850333" y="362620"/>
+            <a:ext cx="4466616" cy="840521"/>
+          </a:xfrm>
+        </p:spPr>
+        <p:txBody>
+          <a:bodyPr vert="horz" lIns="91440" tIns="45720" rIns="91440" bIns="45720" rtlCol="0" anchor="t">
+            <a:normAutofit/>
+          </a:bodyPr>
+          <a:lstStyle/>
+          <a:p>
+            <a:pPr algn="r">
+              <a:lnSpc>
+                <a:spcPct val="130000"/>
+              </a:lnSpc>
+            </a:pPr>
+            <a:r>
+              <a:rPr lang="en-US" sz="3600" spc="1300"/>
+              <a:t>ONTOLOGIA</a:t>
+            </a:r>
+          </a:p>
+        </p:txBody>
+      </p:sp>
+      <p:sp>
+        <p:nvSpPr>
+          <p:cNvPr id="27" name="Rectangle 6">
+            <a:extLst>
+              <a:ext uri="{FF2B5EF4-FFF2-40B4-BE49-F238E27FC236}">
+                <a16:creationId xmlns:a16="http://schemas.microsoft.com/office/drawing/2014/main" id="{44ECD5E8-3FCB-41DC-8B77-590D5265A99C}"/>
+              </a:ext>
+              <a:ext uri="{C183D7F6-B498-43B3-948B-1728B52AA6E4}">
+                <adec:decorative xmlns:adec="http://schemas.microsoft.com/office/drawing/2017/decorative" val="1"/>
+              </a:ext>
+            </a:extLst>
+          </p:cNvPr>
+          <p:cNvSpPr>
+            <a:spLocks noGrp="1" noRot="1" noChangeAspect="1" noMove="1" noResize="1" noEditPoints="1" noAdjustHandles="1" noChangeArrowheads="1" noChangeShapeType="1" noTextEdit="1"/>
+          </p:cNvSpPr>
+          <p:nvPr>
+            <p:extLst>
+              <p:ext uri="{386F3935-93C4-4BCD-93E2-E3B085C9AB24}">
+                <p16:designElem xmlns:p16="http://schemas.microsoft.com/office/powerpoint/2015/main" val="1"/>
+              </p:ext>
+            </p:extLst>
+          </p:nvPr>
+        </p:nvSpPr>
+        <p:spPr>
+          <a:xfrm rot="16200000">
+            <a:off x="79529" y="3026358"/>
+            <a:ext cx="3745582" cy="3917703"/>
+          </a:xfrm>
+          <a:custGeom>
+            <a:avLst/>
+            <a:gdLst>
+              <a:gd name="connsiteX0" fmla="*/ 0 w 1369143"/>
+              <a:gd name="connsiteY0" fmla="*/ 0 h 1229160"/>
+              <a:gd name="connsiteX1" fmla="*/ 1369143 w 1369143"/>
+              <a:gd name="connsiteY1" fmla="*/ 0 h 1229160"/>
+              <a:gd name="connsiteX2" fmla="*/ 1369143 w 1369143"/>
+              <a:gd name="connsiteY2" fmla="*/ 1229160 h 1229160"/>
+              <a:gd name="connsiteX3" fmla="*/ 0 w 1369143"/>
+              <a:gd name="connsiteY3" fmla="*/ 1229160 h 1229160"/>
+              <a:gd name="connsiteX4" fmla="*/ 0 w 1369143"/>
+              <a:gd name="connsiteY4" fmla="*/ 0 h 1229160"/>
+              <a:gd name="connsiteX0" fmla="*/ 0 w 1369143"/>
+              <a:gd name="connsiteY0" fmla="*/ 0 h 1229160"/>
+              <a:gd name="connsiteX1" fmla="*/ 1369143 w 1369143"/>
+              <a:gd name="connsiteY1" fmla="*/ 0 h 1229160"/>
+              <a:gd name="connsiteX2" fmla="*/ 0 w 1369143"/>
+              <a:gd name="connsiteY2" fmla="*/ 1229160 h 1229160"/>
+              <a:gd name="connsiteX3" fmla="*/ 0 w 1369143"/>
+              <a:gd name="connsiteY3" fmla="*/ 0 h 1229160"/>
+            </a:gdLst>
+            <a:ahLst/>
+            <a:cxnLst>
+              <a:cxn ang="0">
+                <a:pos x="connsiteX0" y="connsiteY0"/>
+              </a:cxn>
+              <a:cxn ang="0">
+                <a:pos x="connsiteX1" y="connsiteY1"/>
+              </a:cxn>
+              <a:cxn ang="0">
+                <a:pos x="connsiteX2" y="connsiteY2"/>
+              </a:cxn>
+              <a:cxn ang="0">
+                <a:pos x="connsiteX3" y="connsiteY3"/>
+              </a:cxn>
+            </a:cxnLst>
+            <a:rect l="l" t="t" r="r" b="b"/>
+            <a:pathLst>
+              <a:path w="1369143" h="1229160">
+                <a:moveTo>
+                  <a:pt x="0" y="0"/>
+                </a:moveTo>
+                <a:lnTo>
+                  <a:pt x="1369143" y="0"/>
+                </a:lnTo>
+                <a:lnTo>
+                  <a:pt x="0" y="1229160"/>
+                </a:lnTo>
+                <a:lnTo>
+                  <a:pt x="0" y="0"/>
+                </a:lnTo>
+                <a:close/>
+              </a:path>
+            </a:pathLst>
+          </a:custGeom>
+          <a:solidFill>
+            <a:schemeClr val="accent1">
+              <a:lumMod val="20000"/>
+              <a:lumOff val="80000"/>
+            </a:schemeClr>
+          </a:solidFill>
+          <a:ln w="12700">
+            <a:noFill/>
+          </a:ln>
+          <a:effectLst/>
+        </p:spPr>
+        <p:style>
+          <a:lnRef idx="2">
+            <a:schemeClr val="accent1">
+              <a:shade val="50000"/>
+            </a:schemeClr>
+          </a:lnRef>
+          <a:fillRef idx="1">
+            <a:schemeClr val="accent1"/>
+          </a:fillRef>
+          <a:effectRef idx="0">
+            <a:schemeClr val="accent1"/>
+          </a:effectRef>
+          <a:fontRef idx="minor">
+            <a:schemeClr val="lt1"/>
+          </a:fontRef>
+        </p:style>
+        <p:txBody>
+          <a:bodyPr rtlCol="0" anchor="ctr"/>
+          <a:lstStyle/>
+          <a:p>
+            <a:pPr algn="ctr"/>
+            <a:endParaRPr lang="en-US"/>
+          </a:p>
+        </p:txBody>
+      </p:sp>
+      <p:sp>
+        <p:nvSpPr>
+          <p:cNvPr id="28" name="Freeform: Shape 16">
+            <a:extLst>
+              <a:ext uri="{FF2B5EF4-FFF2-40B4-BE49-F238E27FC236}">
+                <a16:creationId xmlns:a16="http://schemas.microsoft.com/office/drawing/2014/main" id="{ECE001FA-02B8-4073-B3B1-6BB414E19D97}"/>
+              </a:ext>
+              <a:ext uri="{C183D7F6-B498-43B3-948B-1728B52AA6E4}">
+                <adec:decorative xmlns:adec="http://schemas.microsoft.com/office/drawing/2017/decorative" val="1"/>
+              </a:ext>
+            </a:extLst>
+          </p:cNvPr>
+          <p:cNvSpPr>
+            <a:spLocks noGrp="1" noRot="1" noChangeAspect="1" noMove="1" noResize="1" noEditPoints="1" noAdjustHandles="1" noChangeArrowheads="1" noChangeShapeType="1" noTextEdit="1"/>
+          </p:cNvSpPr>
+          <p:nvPr>
+            <p:extLst>
+              <p:ext uri="{386F3935-93C4-4BCD-93E2-E3B085C9AB24}">
+                <p16:designElem xmlns:p16="http://schemas.microsoft.com/office/powerpoint/2015/main" val="1"/>
+              </p:ext>
+            </p:extLst>
+          </p:nvPr>
+        </p:nvSpPr>
+        <p:spPr>
+          <a:xfrm rot="5400000">
+            <a:off x="79529" y="3026358"/>
+            <a:ext cx="3745582" cy="3917703"/>
+          </a:xfrm>
+          <a:custGeom>
+            <a:avLst/>
+            <a:gdLst>
+              <a:gd name="connsiteX0" fmla="*/ 3745582 w 3745582"/>
+              <a:gd name="connsiteY0" fmla="*/ 0 h 3917703"/>
+              <a:gd name="connsiteX1" fmla="*/ 3745582 w 3745582"/>
+              <a:gd name="connsiteY1" fmla="*/ 3917703 h 3917703"/>
+              <a:gd name="connsiteX2" fmla="*/ 0 w 3745582"/>
+              <a:gd name="connsiteY2" fmla="*/ 3917703 h 3917703"/>
+            </a:gdLst>
+            <a:ahLst/>
+            <a:cxnLst>
+              <a:cxn ang="0">
+                <a:pos x="connsiteX0" y="connsiteY0"/>
+              </a:cxn>
+              <a:cxn ang="0">
+                <a:pos x="connsiteX1" y="connsiteY1"/>
+              </a:cxn>
+              <a:cxn ang="0">
+                <a:pos x="connsiteX2" y="connsiteY2"/>
+              </a:cxn>
+            </a:cxnLst>
+            <a:rect l="l" t="t" r="r" b="b"/>
+            <a:pathLst>
+              <a:path w="3745582" h="3917703">
+                <a:moveTo>
+                  <a:pt x="3745582" y="0"/>
+                </a:moveTo>
+                <a:lnTo>
+                  <a:pt x="3745582" y="3917703"/>
+                </a:lnTo>
+                <a:lnTo>
+                  <a:pt x="0" y="3917703"/>
+                </a:lnTo>
+                <a:close/>
+              </a:path>
+            </a:pathLst>
+          </a:custGeom>
+          <a:blipFill dpi="0" rotWithShape="0">
+            <a:blip r:embed="rId4">
+              <a:alphaModFix amt="99000"/>
+              <a:extLst>
+                <a:ext uri="{96DAC541-7B7A-43D3-8B79-37D633B846F1}">
+                  <asvg:svgBlip xmlns:asvg="http://schemas.microsoft.com/office/drawing/2016/SVG/main" r:embed="rId5"/>
+                </a:ext>
+              </a:extLst>
+            </a:blip>
+            <a:srcRect/>
+            <a:tile tx="0" ty="0" sx="40000" sy="40000" flip="none" algn="ctr"/>
+          </a:blipFill>
+          <a:ln>
+            <a:noFill/>
+          </a:ln>
+        </p:spPr>
+        <p:style>
+          <a:lnRef idx="2">
+            <a:schemeClr val="accent1">
+              <a:shade val="50000"/>
+            </a:schemeClr>
+          </a:lnRef>
+          <a:fillRef idx="1">
+            <a:schemeClr val="accent1"/>
+          </a:fillRef>
+          <a:effectRef idx="0">
+            <a:schemeClr val="accent1"/>
+          </a:effectRef>
+          <a:fontRef idx="minor">
+            <a:schemeClr val="lt1"/>
+          </a:fontRef>
+        </p:style>
+        <p:txBody>
+          <a:bodyPr wrap="square" rtlCol="0" anchor="ctr">
+            <a:noAutofit/>
+          </a:bodyPr>
+          <a:lstStyle/>
+          <a:p>
+            <a:pPr algn="ctr"/>
+            <a:endParaRPr lang="en-US"/>
+          </a:p>
+        </p:txBody>
+      </p:sp>
       <p:pic>
         <p:nvPicPr>
-          <p:cNvPr id="2" name="Imagen 1" descr="Interfaz de usuario gráfica, Texto, Aplicación, Correo electrónico&#10;&#10;Descripción generada automáticamente">
-            <a:extLst>
-              <a:ext uri="{FF2B5EF4-FFF2-40B4-BE49-F238E27FC236}">
-                <a16:creationId xmlns:a16="http://schemas.microsoft.com/office/drawing/2014/main" id="{F0646DE3-1FB0-4CC6-BAEB-1D6C158C3DC0}"/>
+          <p:cNvPr id="4" name="Marcador de contenido 3" descr="Imagen que contiene Diagrama&#10;&#10;Descripción generada automáticamente">
+            <a:extLst>
+              <a:ext uri="{FF2B5EF4-FFF2-40B4-BE49-F238E27FC236}">
+                <a16:creationId xmlns:a16="http://schemas.microsoft.com/office/drawing/2014/main" id="{E5DBEA2E-9C5A-0EC0-AB05-4E7AB5A1AF49}"/>
               </a:ext>
             </a:extLst>
           </p:cNvPr>
           <p:cNvPicPr>
-            <a:picLocks noChangeAspect="1"/>
+            <a:picLocks noGrp="1" noChangeAspect="1"/>
           </p:cNvPicPr>
-          <p:nvPr/>
+          <p:nvPr>
+            <p:ph idx="1"/>
+          </p:nvPr>
         </p:nvPicPr>
-        <p:blipFill rotWithShape="1">
-          <a:blip r:embed="rId2"/>
-          <a:srcRect r="19111" b="-1"/>
-          <a:stretch/>
+        <p:blipFill>
+          <a:blip r:embed="rId6"/>
+          <a:stretch>
+            <a:fillRect/>
+          </a:stretch>
         </p:blipFill>
         <p:spPr>
           <a:xfrm>
-            <a:off x="20" y="10"/>
-            <a:ext cx="12191980" cy="6857990"/>
+            <a:off x="800101" y="1165853"/>
+            <a:ext cx="7236327" cy="4962566"/>
           </a:xfrm>
           <a:prstGeom prst="rect">
             <a:avLst/>
           </a:prstGeom>
         </p:spPr>
       </p:pic>
+      <p:sp>
+        <p:nvSpPr>
+          <p:cNvPr id="29" name="Rectangle 18">
+            <a:extLst>
+              <a:ext uri="{FF2B5EF4-FFF2-40B4-BE49-F238E27FC236}">
+                <a16:creationId xmlns:a16="http://schemas.microsoft.com/office/drawing/2014/main" id="{4DDD66E1-3885-409E-A90C-365AFEC05DB7}"/>
+              </a:ext>
+              <a:ext uri="{C183D7F6-B498-43B3-948B-1728B52AA6E4}">
+                <adec:decorative xmlns:adec="http://schemas.microsoft.com/office/drawing/2017/decorative" val="1"/>
+              </a:ext>
+            </a:extLst>
+          </p:cNvPr>
+          <p:cNvSpPr>
+            <a:spLocks noGrp="1" noRot="1" noChangeAspect="1" noMove="1" noResize="1" noEditPoints="1" noAdjustHandles="1" noChangeArrowheads="1" noChangeShapeType="1" noTextEdit="1"/>
+          </p:cNvSpPr>
+          <p:nvPr>
+            <p:extLst>
+              <p:ext uri="{386F3935-93C4-4BCD-93E2-E3B085C9AB24}">
+                <p16:designElem xmlns:p16="http://schemas.microsoft.com/office/powerpoint/2015/main" val="1"/>
+              </p:ext>
+            </p:extLst>
+          </p:nvPr>
+        </p:nvSpPr>
+        <p:spPr>
+          <a:xfrm flipV="1">
+            <a:off x="11986775" y="0"/>
+            <a:ext cx="206609" cy="2021305"/>
+          </a:xfrm>
+          <a:prstGeom prst="rect">
+            <a:avLst/>
+          </a:prstGeom>
+          <a:solidFill>
+            <a:schemeClr val="accent2"/>
+          </a:solidFill>
+          <a:ln>
+            <a:noFill/>
+          </a:ln>
+        </p:spPr>
+        <p:style>
+          <a:lnRef idx="2">
+            <a:schemeClr val="accent1">
+              <a:shade val="50000"/>
+            </a:schemeClr>
+          </a:lnRef>
+          <a:fillRef idx="1">
+            <a:schemeClr val="accent1"/>
+          </a:fillRef>
+          <a:effectRef idx="0">
+            <a:schemeClr val="accent1"/>
+          </a:effectRef>
+          <a:fontRef idx="minor">
+            <a:schemeClr val="lt1"/>
+          </a:fontRef>
+        </p:style>
+        <p:txBody>
+          <a:bodyPr rtlCol="0" anchor="ctr"/>
+          <a:lstStyle/>
+          <a:p>
+            <a:pPr algn="ctr"/>
+            <a:endParaRPr lang="en-US"/>
+          </a:p>
+        </p:txBody>
+      </p:sp>
     </p:spTree>
     <p:extLst>
       <p:ext uri="{BB962C8B-B14F-4D97-AF65-F5344CB8AC3E}">
-        <p14:creationId xmlns:p14="http://schemas.microsoft.com/office/powerpoint/2010/main" val="2922464807"/>
+        <p14:creationId xmlns:p14="http://schemas.microsoft.com/office/powerpoint/2010/main" val="2817952850"/>
       </p:ext>
     </p:extLst>
   </p:cSld>
@@ -7045,6 +7681,14 @@
 <file path=ppt/slides/slide4.xml><?xml version="1.0" encoding="utf-8"?>
 <p:sld xmlns:a="http://schemas.openxmlformats.org/drawingml/2006/main" xmlns:r="http://schemas.openxmlformats.org/officeDocument/2006/relationships" xmlns:p="http://schemas.openxmlformats.org/presentationml/2006/main">
   <p:cSld>
+    <p:bg>
+      <p:bgPr>
+        <a:solidFill>
+          <a:schemeClr val="bg1"/>
+        </a:solidFill>
+        <a:effectLst/>
+      </p:bgPr>
+    </p:bg>
     <p:spTree>
       <p:nvGrpSpPr>
         <p:cNvPr id="1" name=""/>
@@ -7059,12 +7703,88 @@
           <a:chExt cx="0" cy="0"/>
         </a:xfrm>
       </p:grpSpPr>
+      <p:sp useBgFill="1">
+        <p:nvSpPr>
+          <p:cNvPr id="7" name="Rectangle 6">
+            <a:extLst>
+              <a:ext uri="{FF2B5EF4-FFF2-40B4-BE49-F238E27FC236}">
+                <a16:creationId xmlns:a16="http://schemas.microsoft.com/office/drawing/2014/main" id="{ECC11440-8FCC-46C6-A3E0-D0649600F55F}"/>
+              </a:ext>
+              <a:ext uri="{C183D7F6-B498-43B3-948B-1728B52AA6E4}">
+                <adec:decorative xmlns:adec="http://schemas.microsoft.com/office/drawing/2017/decorative" val="1"/>
+              </a:ext>
+            </a:extLst>
+          </p:cNvPr>
+          <p:cNvSpPr>
+            <a:spLocks noGrp="1" noRot="1" noChangeAspect="1" noMove="1" noResize="1" noEditPoints="1" noAdjustHandles="1" noChangeArrowheads="1" noChangeShapeType="1" noTextEdit="1"/>
+          </p:cNvSpPr>
+          <p:nvPr>
+            <p:extLst>
+              <p:ext uri="{386F3935-93C4-4BCD-93E2-E3B085C9AB24}">
+                <p16:designElem xmlns:p16="http://schemas.microsoft.com/office/powerpoint/2015/main" val="1"/>
+              </p:ext>
+            </p:extLst>
+          </p:nvPr>
+        </p:nvSpPr>
+        <p:spPr>
+          <a:xfrm>
+            <a:off x="0" y="0"/>
+            <a:ext cx="12192000" cy="6858000"/>
+          </a:xfrm>
+          <a:prstGeom prst="rect">
+            <a:avLst/>
+          </a:prstGeom>
+          <a:ln w="12700" cap="flat" cmpd="sng" algn="ctr">
+            <a:noFill/>
+            <a:prstDash val="solid"/>
+            <a:miter lim="800000"/>
+          </a:ln>
+          <a:effectLst/>
+          <a:extLst>
+            <a:ext uri="{91240B29-F687-4F45-9708-019B960494DF}">
+              <a14:hiddenLine xmlns:a14="http://schemas.microsoft.com/office/drawing/2010/main" w="12700" cap="flat" cmpd="sng" algn="ctr">
+                <a:solidFill>
+                  <a:schemeClr val="accent1">
+                    <a:shade val="50000"/>
+                  </a:schemeClr>
+                </a:solidFill>
+                <a:prstDash val="solid"/>
+                <a:miter lim="800000"/>
+              </a14:hiddenLine>
+            </a:ext>
+          </a:extLst>
+        </p:spPr>
+        <p:style>
+          <a:lnRef idx="2">
+            <a:schemeClr val="accent1">
+              <a:shade val="50000"/>
+            </a:schemeClr>
+          </a:lnRef>
+          <a:fillRef idx="1">
+            <a:schemeClr val="accent1"/>
+          </a:fillRef>
+          <a:effectRef idx="0">
+            <a:schemeClr val="accent1"/>
+          </a:effectRef>
+          <a:fontRef idx="minor">
+            <a:schemeClr val="lt1"/>
+          </a:fontRef>
+        </p:style>
+        <p:txBody>
+          <a:bodyPr rtlCol="0" anchor="ctr"/>
+          <a:lstStyle/>
+          <a:p>
+            <a:pPr algn="ctr"/>
+            <a:endParaRPr lang="en-US"/>
+          </a:p>
+        </p:txBody>
+      </p:sp>
       <p:pic>
         <p:nvPicPr>
-          <p:cNvPr id="4" name="Picture 3">
-            <a:extLst>
-              <a:ext uri="{FF2B5EF4-FFF2-40B4-BE49-F238E27FC236}">
-                <a16:creationId xmlns:a16="http://schemas.microsoft.com/office/drawing/2014/main" id="{877CB36C-9EE4-ABDA-6FE5-F4A883023766}"/>
+          <p:cNvPr id="2" name="Imagen 1" descr="Interfaz de usuario gráfica, Texto, Aplicación, Correo electrónico&#10;&#10;Descripción generada automáticamente">
+            <a:extLst>
+              <a:ext uri="{FF2B5EF4-FFF2-40B4-BE49-F238E27FC236}">
+                <a16:creationId xmlns:a16="http://schemas.microsoft.com/office/drawing/2014/main" id="{F0646DE3-1FB0-4CC6-BAEB-1D6C158C3DC0}"/>
               </a:ext>
             </a:extLst>
           </p:cNvPr>
@@ -7074,47 +7794,14 @@
           <p:nvPr/>
         </p:nvPicPr>
         <p:blipFill rotWithShape="1">
-          <a:blip r:embed="rId2">
-            <a:alphaModFix amt="50000"/>
-          </a:blip>
-          <a:srcRect t="25000"/>
+          <a:blip r:embed="rId2"/>
+          <a:srcRect r="19111" b="-1"/>
           <a:stretch/>
         </p:blipFill>
         <p:spPr>
           <a:xfrm>
-            <a:off x="20" y="0"/>
+            <a:off x="20" y="10"/>
             <a:ext cx="12191980" cy="6857990"/>
-          </a:xfrm>
-          <a:prstGeom prst="rect">
-            <a:avLst/>
-          </a:prstGeom>
-          <a:noFill/>
-        </p:spPr>
-      </p:pic>
-      <p:pic>
-        <p:nvPicPr>
-          <p:cNvPr id="2" name="Imagen 1" descr="Interfaz de usuario gráfica, Texto, Aplicación, Correo electrónico&#10;&#10;Descripción generada automáticamente">
-            <a:extLst>
-              <a:ext uri="{FF2B5EF4-FFF2-40B4-BE49-F238E27FC236}">
-                <a16:creationId xmlns:a16="http://schemas.microsoft.com/office/drawing/2014/main" id="{91F5EA1D-1EE5-152A-6326-76E0AB4B1BE7}"/>
-              </a:ext>
-            </a:extLst>
-          </p:cNvPr>
-          <p:cNvPicPr>
-            <a:picLocks noChangeAspect="1"/>
-          </p:cNvPicPr>
-          <p:nvPr/>
-        </p:nvPicPr>
-        <p:blipFill>
-          <a:blip r:embed="rId3"/>
-          <a:stretch>
-            <a:fillRect/>
-          </a:stretch>
-        </p:blipFill>
-        <p:spPr>
-          <a:xfrm>
-            <a:off x="0" y="228467"/>
-            <a:ext cx="12192000" cy="6375528"/>
           </a:xfrm>
           <a:prstGeom prst="rect">
             <a:avLst/>
@@ -7124,7 +7811,7 @@
     </p:spTree>
     <p:extLst>
       <p:ext uri="{BB962C8B-B14F-4D97-AF65-F5344CB8AC3E}">
-        <p14:creationId xmlns:p14="http://schemas.microsoft.com/office/powerpoint/2010/main" val="1269338804"/>
+        <p14:creationId xmlns:p14="http://schemas.microsoft.com/office/powerpoint/2010/main" val="2922464807"/>
       </p:ext>
     </p:extLst>
   </p:cSld>
@@ -7153,10 +7840,10 @@
       </p:grpSpPr>
       <p:pic>
         <p:nvPicPr>
-          <p:cNvPr id="3" name="Picture 3">
-            <a:extLst>
-              <a:ext uri="{FF2B5EF4-FFF2-40B4-BE49-F238E27FC236}">
-                <a16:creationId xmlns:a16="http://schemas.microsoft.com/office/drawing/2014/main" id="{1976907E-D0BB-C305-C372-E069B490DA1D}"/>
+          <p:cNvPr id="4" name="Picture 3">
+            <a:extLst>
+              <a:ext uri="{FF2B5EF4-FFF2-40B4-BE49-F238E27FC236}">
+                <a16:creationId xmlns:a16="http://schemas.microsoft.com/office/drawing/2014/main" id="{877CB36C-9EE4-ABDA-6FE5-F4A883023766}"/>
               </a:ext>
             </a:extLst>
           </p:cNvPr>
@@ -7188,7 +7875,7 @@
           <p:cNvPr id="2" name="Imagen 1" descr="Interfaz de usuario gráfica, Texto, Aplicación, Correo electrónico&#10;&#10;Descripción generada automáticamente">
             <a:extLst>
               <a:ext uri="{FF2B5EF4-FFF2-40B4-BE49-F238E27FC236}">
-                <a16:creationId xmlns:a16="http://schemas.microsoft.com/office/drawing/2014/main" id="{EA65E996-150E-9E1D-2EDC-5E6C6EFE5A3F}"/>
+                <a16:creationId xmlns:a16="http://schemas.microsoft.com/office/drawing/2014/main" id="{91F5EA1D-1EE5-152A-6326-76E0AB4B1BE7}"/>
               </a:ext>
             </a:extLst>
           </p:cNvPr>
@@ -7205,8 +7892,8 @@
         </p:blipFill>
         <p:spPr>
           <a:xfrm>
-            <a:off x="0" y="635010"/>
-            <a:ext cx="12191980" cy="5745470"/>
+            <a:off x="0" y="228467"/>
+            <a:ext cx="12192000" cy="6375528"/>
           </a:xfrm>
           <a:prstGeom prst="rect">
             <a:avLst/>
@@ -7216,7 +7903,7 @@
     </p:spTree>
     <p:extLst>
       <p:ext uri="{BB962C8B-B14F-4D97-AF65-F5344CB8AC3E}">
-        <p14:creationId xmlns:p14="http://schemas.microsoft.com/office/powerpoint/2010/main" val="4175403590"/>
+        <p14:creationId xmlns:p14="http://schemas.microsoft.com/office/powerpoint/2010/main" val="1269338804"/>
       </p:ext>
     </p:extLst>
   </p:cSld>
@@ -7248,7 +7935,7 @@
           <p:cNvPr id="3" name="Picture 3">
             <a:extLst>
               <a:ext uri="{FF2B5EF4-FFF2-40B4-BE49-F238E27FC236}">
-                <a16:creationId xmlns:a16="http://schemas.microsoft.com/office/drawing/2014/main" id="{B9F59CFD-179C-8566-4AE9-097254EBC0F8}"/>
+                <a16:creationId xmlns:a16="http://schemas.microsoft.com/office/drawing/2014/main" id="{1976907E-D0BB-C305-C372-E069B490DA1D}"/>
               </a:ext>
             </a:extLst>
           </p:cNvPr>
@@ -7277,10 +7964,10 @@
       </p:pic>
       <p:pic>
         <p:nvPicPr>
-          <p:cNvPr id="4" name="Imagen 3">
-            <a:extLst>
-              <a:ext uri="{FF2B5EF4-FFF2-40B4-BE49-F238E27FC236}">
-                <a16:creationId xmlns:a16="http://schemas.microsoft.com/office/drawing/2014/main" id="{149CA177-BA71-F75F-5504-DBBEB94A093E}"/>
+          <p:cNvPr id="2" name="Imagen 1" descr="Interfaz de usuario gráfica, Texto, Aplicación, Correo electrónico&#10;&#10;Descripción generada automáticamente">
+            <a:extLst>
+              <a:ext uri="{FF2B5EF4-FFF2-40B4-BE49-F238E27FC236}">
+                <a16:creationId xmlns:a16="http://schemas.microsoft.com/office/drawing/2014/main" id="{EA65E996-150E-9E1D-2EDC-5E6C6EFE5A3F}"/>
               </a:ext>
             </a:extLst>
           </p:cNvPr>
@@ -7297,8 +7984,8 @@
         </p:blipFill>
         <p:spPr>
           <a:xfrm>
-            <a:off x="0" y="563884"/>
-            <a:ext cx="12191980" cy="5730231"/>
+            <a:off x="0" y="635010"/>
+            <a:ext cx="12191980" cy="5745470"/>
           </a:xfrm>
           <a:prstGeom prst="rect">
             <a:avLst/>
@@ -7308,7 +7995,7 @@
     </p:spTree>
     <p:extLst>
       <p:ext uri="{BB962C8B-B14F-4D97-AF65-F5344CB8AC3E}">
-        <p14:creationId xmlns:p14="http://schemas.microsoft.com/office/powerpoint/2010/main" val="1668333144"/>
+        <p14:creationId xmlns:p14="http://schemas.microsoft.com/office/powerpoint/2010/main" val="4175403590"/>
       </p:ext>
     </p:extLst>
   </p:cSld>
@@ -7340,7 +8027,7 @@
           <p:cNvPr id="3" name="Picture 3">
             <a:extLst>
               <a:ext uri="{FF2B5EF4-FFF2-40B4-BE49-F238E27FC236}">
-                <a16:creationId xmlns:a16="http://schemas.microsoft.com/office/drawing/2014/main" id="{7A4BABB4-12D4-4914-E9E0-E3AD5166D1CA}"/>
+                <a16:creationId xmlns:a16="http://schemas.microsoft.com/office/drawing/2014/main" id="{B9F59CFD-179C-8566-4AE9-097254EBC0F8}"/>
               </a:ext>
             </a:extLst>
           </p:cNvPr>
@@ -7372,7 +8059,7 @@
           <p:cNvPr id="4" name="Imagen 3">
             <a:extLst>
               <a:ext uri="{FF2B5EF4-FFF2-40B4-BE49-F238E27FC236}">
-                <a16:creationId xmlns:a16="http://schemas.microsoft.com/office/drawing/2014/main" id="{C2AD4D1C-9876-0854-C838-73A390214FFC}"/>
+                <a16:creationId xmlns:a16="http://schemas.microsoft.com/office/drawing/2014/main" id="{149CA177-BA71-F75F-5504-DBBEB94A093E}"/>
               </a:ext>
             </a:extLst>
           </p:cNvPr>
@@ -7389,8 +8076,8 @@
         </p:blipFill>
         <p:spPr>
           <a:xfrm>
-            <a:off x="0" y="558062"/>
-            <a:ext cx="12191980" cy="5741883"/>
+            <a:off x="0" y="563884"/>
+            <a:ext cx="12191980" cy="5730231"/>
           </a:xfrm>
           <a:prstGeom prst="rect">
             <a:avLst/>
@@ -7400,7 +8087,7 @@
     </p:spTree>
     <p:extLst>
       <p:ext uri="{BB962C8B-B14F-4D97-AF65-F5344CB8AC3E}">
-        <p14:creationId xmlns:p14="http://schemas.microsoft.com/office/powerpoint/2010/main" val="3844755233"/>
+        <p14:creationId xmlns:p14="http://schemas.microsoft.com/office/powerpoint/2010/main" val="1668333144"/>
       </p:ext>
     </p:extLst>
   </p:cSld>
@@ -7432,7 +8119,7 @@
           <p:cNvPr id="3" name="Picture 3">
             <a:extLst>
               <a:ext uri="{FF2B5EF4-FFF2-40B4-BE49-F238E27FC236}">
-                <a16:creationId xmlns:a16="http://schemas.microsoft.com/office/drawing/2014/main" id="{CAA91386-B6C4-C0E7-494F-852F4E941914}"/>
+                <a16:creationId xmlns:a16="http://schemas.microsoft.com/office/drawing/2014/main" id="{7A4BABB4-12D4-4914-E9E0-E3AD5166D1CA}"/>
               </a:ext>
             </a:extLst>
           </p:cNvPr>
@@ -7461,10 +8148,10 @@
       </p:pic>
       <p:pic>
         <p:nvPicPr>
-          <p:cNvPr id="2" name="Imagen 1" descr="Interfaz de usuario gráfica, Texto, Aplicación, Correo electrónico&#10;&#10;Descripción generada automáticamente">
-            <a:extLst>
-              <a:ext uri="{FF2B5EF4-FFF2-40B4-BE49-F238E27FC236}">
-                <a16:creationId xmlns:a16="http://schemas.microsoft.com/office/drawing/2014/main" id="{3972704A-4768-F47E-2D52-6164E26173CE}"/>
+          <p:cNvPr id="4" name="Imagen 3">
+            <a:extLst>
+              <a:ext uri="{FF2B5EF4-FFF2-40B4-BE49-F238E27FC236}">
+                <a16:creationId xmlns:a16="http://schemas.microsoft.com/office/drawing/2014/main" id="{C2AD4D1C-9876-0854-C838-73A390214FFC}"/>
               </a:ext>
             </a:extLst>
           </p:cNvPr>
@@ -7481,8 +8168,8 @@
         </p:blipFill>
         <p:spPr>
           <a:xfrm>
-            <a:off x="4263" y="567791"/>
-            <a:ext cx="12187737" cy="5722418"/>
+            <a:off x="0" y="558062"/>
+            <a:ext cx="12191980" cy="5741883"/>
           </a:xfrm>
           <a:prstGeom prst="rect">
             <a:avLst/>
@@ -7492,7 +8179,7 @@
     </p:spTree>
     <p:extLst>
       <p:ext uri="{BB962C8B-B14F-4D97-AF65-F5344CB8AC3E}">
-        <p14:creationId xmlns:p14="http://schemas.microsoft.com/office/powerpoint/2010/main" val="3999069044"/>
+        <p14:creationId xmlns:p14="http://schemas.microsoft.com/office/powerpoint/2010/main" val="3844755233"/>
       </p:ext>
     </p:extLst>
   </p:cSld>
@@ -7524,7 +8211,7 @@
           <p:cNvPr id="3" name="Picture 3">
             <a:extLst>
               <a:ext uri="{FF2B5EF4-FFF2-40B4-BE49-F238E27FC236}">
-                <a16:creationId xmlns:a16="http://schemas.microsoft.com/office/drawing/2014/main" id="{FBCC56E4-4EE3-DF8C-21AC-B277EDFABFFB}"/>
+                <a16:creationId xmlns:a16="http://schemas.microsoft.com/office/drawing/2014/main" id="{CAA91386-B6C4-C0E7-494F-852F4E941914}"/>
               </a:ext>
             </a:extLst>
           </p:cNvPr>
@@ -7553,10 +8240,10 @@
       </p:pic>
       <p:pic>
         <p:nvPicPr>
-          <p:cNvPr id="2" name="Imagen 1">
-            <a:extLst>
-              <a:ext uri="{FF2B5EF4-FFF2-40B4-BE49-F238E27FC236}">
-                <a16:creationId xmlns:a16="http://schemas.microsoft.com/office/drawing/2014/main" id="{5E4F5F6C-A4A9-E385-77D2-894D6A918CF6}"/>
+          <p:cNvPr id="2" name="Imagen 1" descr="Interfaz de usuario gráfica, Texto, Aplicación, Correo electrónico&#10;&#10;Descripción generada automáticamente">
+            <a:extLst>
+              <a:ext uri="{FF2B5EF4-FFF2-40B4-BE49-F238E27FC236}">
+                <a16:creationId xmlns:a16="http://schemas.microsoft.com/office/drawing/2014/main" id="{3972704A-4768-F47E-2D52-6164E26173CE}"/>
               </a:ext>
             </a:extLst>
           </p:cNvPr>
@@ -7573,8 +8260,8 @@
         </p:blipFill>
         <p:spPr>
           <a:xfrm>
-            <a:off x="0" y="544467"/>
-            <a:ext cx="12191980" cy="5769076"/>
+            <a:off x="4263" y="567791"/>
+            <a:ext cx="12187737" cy="5722418"/>
           </a:xfrm>
           <a:prstGeom prst="rect">
             <a:avLst/>
@@ -7584,7 +8271,7 @@
     </p:spTree>
     <p:extLst>
       <p:ext uri="{BB962C8B-B14F-4D97-AF65-F5344CB8AC3E}">
-        <p14:creationId xmlns:p14="http://schemas.microsoft.com/office/powerpoint/2010/main" val="1682990297"/>
+        <p14:creationId xmlns:p14="http://schemas.microsoft.com/office/powerpoint/2010/main" val="3999069044"/>
       </p:ext>
     </p:extLst>
   </p:cSld>

</xml_diff>